<commit_message>
MAJ scripts et cours
</commit_message>
<xml_diff>
--- a/cours/GM - Travaux pratiques - cas concrets.pptx
+++ b/cours/GM - Travaux pratiques - cas concrets.pptx
@@ -6,23 +6,28 @@
     <p:sldMasterId id="2147483666" r:id="rId2"/>
   </p:sldMasterIdLst>
   <p:notesMasterIdLst>
-    <p:notesMasterId r:id="rId17"/>
+    <p:notesMasterId r:id="rId22"/>
   </p:notesMasterIdLst>
   <p:sldIdLst>
     <p:sldId id="256" r:id="rId3"/>
-    <p:sldId id="336" r:id="rId4"/>
-    <p:sldId id="332" r:id="rId5"/>
-    <p:sldId id="267" r:id="rId6"/>
-    <p:sldId id="341" r:id="rId7"/>
-    <p:sldId id="338" r:id="rId8"/>
-    <p:sldId id="274" r:id="rId9"/>
-    <p:sldId id="275" r:id="rId10"/>
-    <p:sldId id="335" r:id="rId11"/>
-    <p:sldId id="337" r:id="rId12"/>
-    <p:sldId id="334" r:id="rId13"/>
-    <p:sldId id="268" r:id="rId14"/>
-    <p:sldId id="339" r:id="rId15"/>
-    <p:sldId id="340" r:id="rId16"/>
+    <p:sldId id="342" r:id="rId4"/>
+    <p:sldId id="344" r:id="rId5"/>
+    <p:sldId id="343" r:id="rId6"/>
+    <p:sldId id="345" r:id="rId7"/>
+    <p:sldId id="336" r:id="rId8"/>
+    <p:sldId id="332" r:id="rId9"/>
+    <p:sldId id="267" r:id="rId10"/>
+    <p:sldId id="341" r:id="rId11"/>
+    <p:sldId id="338" r:id="rId12"/>
+    <p:sldId id="274" r:id="rId13"/>
+    <p:sldId id="275" r:id="rId14"/>
+    <p:sldId id="335" r:id="rId15"/>
+    <p:sldId id="337" r:id="rId16"/>
+    <p:sldId id="334" r:id="rId17"/>
+    <p:sldId id="268" r:id="rId18"/>
+    <p:sldId id="339" r:id="rId19"/>
+    <p:sldId id="340" r:id="rId20"/>
+    <p:sldId id="346" r:id="rId21"/>
   </p:sldIdLst>
   <p:sldSz cx="12192000" cy="6858000"/>
   <p:notesSz cx="6858000" cy="9144000"/>
@@ -211,7 +216,7 @@
           <a:p>
             <a:fld id="{05CF0F9A-6161-450D-AD24-FE13ECDFFC91}" type="datetimeFigureOut">
               <a:rPr lang="fr-FR" smtClean="0"/>
-              <a:t>15/11/2022</a:t>
+              <a:t>06/01/2023</a:t>
             </a:fld>
             <a:endParaRPr lang="fr-FR"/>
           </a:p>
@@ -563,6 +568,313 @@
 </p:notes>
 </file>
 
+<file path=ppt/notesSlides/notesSlide10.xml><?xml version="1.0" encoding="utf-8"?>
+<p:notes xmlns:a="http://schemas.openxmlformats.org/drawingml/2006/main" xmlns:r="http://schemas.openxmlformats.org/officeDocument/2006/relationships" xmlns:p="http://schemas.openxmlformats.org/presentationml/2006/main">
+  <p:cSld>
+    <p:spTree>
+      <p:nvGrpSpPr>
+        <p:cNvPr id="1" name=""/>
+        <p:cNvGrpSpPr/>
+        <p:nvPr/>
+      </p:nvGrpSpPr>
+      <p:grpSpPr>
+        <a:xfrm>
+          <a:off x="0" y="0"/>
+          <a:ext cx="0" cy="0"/>
+          <a:chOff x="0" y="0"/>
+          <a:chExt cx="0" cy="0"/>
+        </a:xfrm>
+      </p:grpSpPr>
+      <p:sp>
+        <p:nvSpPr>
+          <p:cNvPr id="2" name="Espace réservé de l'image des diapositives 1"/>
+          <p:cNvSpPr>
+            <a:spLocks noGrp="1" noRot="1" noChangeAspect="1"/>
+          </p:cNvSpPr>
+          <p:nvPr>
+            <p:ph type="sldImg"/>
+          </p:nvPr>
+        </p:nvSpPr>
+        <p:spPr/>
+      </p:sp>
+      <p:sp>
+        <p:nvSpPr>
+          <p:cNvPr id="3" name="Espace réservé des commentaires 2"/>
+          <p:cNvSpPr>
+            <a:spLocks noGrp="1"/>
+          </p:cNvSpPr>
+          <p:nvPr>
+            <p:ph type="body" idx="1"/>
+          </p:nvPr>
+        </p:nvSpPr>
+        <p:spPr/>
+        <p:txBody>
+          <a:bodyPr/>
+          <a:lstStyle/>
+          <a:p>
+            <a:pPr marL="228600" indent="-228600">
+              <a:buAutoNum type="arabicParenR"/>
+            </a:pPr>
+            <a:r>
+              <a:rPr lang="fr-FR" baseline="0" dirty="0" smtClean="0"/>
+              <a:t>Importer le vecteur</a:t>
+            </a:r>
+          </a:p>
+          <a:p>
+            <a:pPr marL="228600" indent="-228600">
+              <a:buAutoNum type="arabicParenR"/>
+            </a:pPr>
+            <a:endParaRPr lang="fr-FR" baseline="0" dirty="0" smtClean="0"/>
+          </a:p>
+          <a:p>
+            <a:pPr marL="228600" indent="-228600">
+              <a:buAutoNum type="arabicParenR"/>
+            </a:pPr>
+            <a:r>
+              <a:rPr lang="fr-FR" baseline="0" dirty="0" smtClean="0"/>
+              <a:t>Trouver le point le plus haut</a:t>
+            </a:r>
+          </a:p>
+          <a:p>
+            <a:pPr marL="171450" marR="0" indent="-171450" algn="l" defTabSz="914400" rtl="0" eaLnBrk="1" fontAlgn="auto" latinLnBrk="0" hangingPunct="1">
+              <a:lnSpc>
+                <a:spcPct val="100000"/>
+              </a:lnSpc>
+              <a:spcBef>
+                <a:spcPts val="0"/>
+              </a:spcBef>
+              <a:spcAft>
+                <a:spcPts val="0"/>
+              </a:spcAft>
+              <a:buClrTx/>
+              <a:buSzTx/>
+              <a:buFontTx/>
+              <a:buChar char="-"/>
+              <a:tabLst/>
+              <a:defRPr/>
+            </a:pPr>
+            <a:r>
+              <a:rPr lang="fr-FR" baseline="0" dirty="0" smtClean="0"/>
+              <a:t>Avec le numériseur, sélectionner la zone dans laquelle chercher</a:t>
+            </a:r>
+          </a:p>
+          <a:p>
+            <a:pPr marL="171450" marR="0" indent="-171450" algn="l" defTabSz="914400" rtl="0" eaLnBrk="1" fontAlgn="auto" latinLnBrk="0" hangingPunct="1">
+              <a:lnSpc>
+                <a:spcPct val="100000"/>
+              </a:lnSpc>
+              <a:spcBef>
+                <a:spcPts val="0"/>
+              </a:spcBef>
+              <a:spcAft>
+                <a:spcPts val="0"/>
+              </a:spcAft>
+              <a:buClrTx/>
+              <a:buSzTx/>
+              <a:buFontTx/>
+              <a:buChar char="-"/>
+              <a:tabLst/>
+              <a:defRPr/>
+            </a:pPr>
+            <a:r>
+              <a:rPr lang="fr-FR" baseline="0" dirty="0" smtClean="0"/>
+              <a:t>Clic droit -&gt; </a:t>
+            </a:r>
+            <a:r>
+              <a:rPr lang="fr-FR" baseline="0" dirty="0" err="1" smtClean="0"/>
+              <a:t>Analysis</a:t>
+            </a:r>
+            <a:r>
+              <a:rPr lang="fr-FR" baseline="0" dirty="0" smtClean="0"/>
+              <a:t>/</a:t>
+            </a:r>
+            <a:r>
+              <a:rPr lang="fr-FR" baseline="0" dirty="0" err="1" smtClean="0"/>
+              <a:t>measurements</a:t>
+            </a:r>
+            <a:r>
+              <a:rPr lang="fr-FR" baseline="0" dirty="0" smtClean="0"/>
+              <a:t> -&gt; </a:t>
+            </a:r>
+            <a:r>
+              <a:rPr lang="fr-FR" baseline="0" dirty="0" err="1" smtClean="0"/>
+              <a:t>Calculate</a:t>
+            </a:r>
+            <a:r>
+              <a:rPr lang="fr-FR" baseline="0" dirty="0" smtClean="0"/>
+              <a:t> </a:t>
+            </a:r>
+            <a:r>
+              <a:rPr lang="fr-FR" baseline="0" dirty="0" err="1" smtClean="0"/>
+              <a:t>Elevation</a:t>
+            </a:r>
+            <a:r>
+              <a:rPr lang="fr-FR" baseline="0" dirty="0" smtClean="0"/>
+              <a:t>/</a:t>
+            </a:r>
+            <a:r>
+              <a:rPr lang="fr-FR" baseline="0" dirty="0" err="1" smtClean="0"/>
+              <a:t>slope</a:t>
+            </a:r>
+            <a:r>
+              <a:rPr lang="fr-FR" baseline="0" dirty="0" smtClean="0"/>
+              <a:t>…</a:t>
+            </a:r>
+          </a:p>
+          <a:p>
+            <a:pPr marL="171450" marR="0" indent="-171450" algn="l" defTabSz="914400" rtl="0" eaLnBrk="1" fontAlgn="auto" latinLnBrk="0" hangingPunct="1">
+              <a:lnSpc>
+                <a:spcPct val="100000"/>
+              </a:lnSpc>
+              <a:spcBef>
+                <a:spcPts val="0"/>
+              </a:spcBef>
+              <a:spcAft>
+                <a:spcPts val="0"/>
+              </a:spcAft>
+              <a:buClrTx/>
+              <a:buSzTx/>
+              <a:buFontTx/>
+              <a:buChar char="-"/>
+              <a:tabLst/>
+              <a:defRPr/>
+            </a:pPr>
+            <a:r>
+              <a:rPr lang="fr-FR" baseline="0" dirty="0" smtClean="0"/>
+              <a:t>Les points les plus haut et bas sont ajoutés</a:t>
+            </a:r>
+          </a:p>
+          <a:p>
+            <a:pPr marL="0" indent="0">
+              <a:buNone/>
+            </a:pPr>
+            <a:endParaRPr lang="fr-FR" baseline="0" dirty="0" smtClean="0"/>
+          </a:p>
+          <a:p>
+            <a:pPr marL="0" indent="0">
+              <a:buNone/>
+            </a:pPr>
+            <a:r>
+              <a:rPr lang="fr-FR" baseline="0" dirty="0" smtClean="0"/>
+              <a:t>3) </a:t>
+            </a:r>
+            <a:r>
+              <a:rPr lang="fr-FR" baseline="0" dirty="0" err="1" smtClean="0"/>
+              <a:t>Intervisiblité</a:t>
+            </a:r>
+            <a:endParaRPr lang="fr-FR" dirty="0" smtClean="0"/>
+          </a:p>
+          <a:p>
+            <a:pPr marL="171450" indent="-171450">
+              <a:buFontTx/>
+              <a:buChar char="-"/>
+            </a:pPr>
+            <a:r>
+              <a:rPr lang="fr-FR" dirty="0" smtClean="0"/>
+              <a:t>Sélectionner</a:t>
+            </a:r>
+            <a:r>
+              <a:rPr lang="fr-FR" baseline="0" dirty="0" smtClean="0"/>
+              <a:t> le point avec le numériseur</a:t>
+            </a:r>
+          </a:p>
+          <a:p>
+            <a:pPr marL="171450" indent="-171450">
+              <a:buFontTx/>
+              <a:buChar char="-"/>
+            </a:pPr>
+            <a:r>
+              <a:rPr lang="fr-FR" baseline="0" dirty="0" smtClean="0"/>
+              <a:t>Clic droit -&gt; </a:t>
+            </a:r>
+            <a:r>
+              <a:rPr lang="fr-FR" baseline="0" dirty="0" err="1" smtClean="0"/>
+              <a:t>Analysis</a:t>
+            </a:r>
+            <a:r>
+              <a:rPr lang="fr-FR" baseline="0" dirty="0" smtClean="0"/>
+              <a:t>/</a:t>
+            </a:r>
+            <a:r>
+              <a:rPr lang="fr-FR" baseline="0" dirty="0" err="1" smtClean="0"/>
+              <a:t>measurement</a:t>
+            </a:r>
+            <a:r>
+              <a:rPr lang="fr-FR" baseline="0" dirty="0" smtClean="0"/>
+              <a:t> -&gt; </a:t>
+            </a:r>
+            <a:r>
+              <a:rPr lang="fr-FR" baseline="0" dirty="0" err="1" smtClean="0"/>
+              <a:t>calculate</a:t>
+            </a:r>
+            <a:r>
+              <a:rPr lang="fr-FR" baseline="0" dirty="0" smtClean="0"/>
+              <a:t> </a:t>
+            </a:r>
+            <a:r>
+              <a:rPr lang="fr-FR" baseline="0" dirty="0" err="1" smtClean="0"/>
+              <a:t>view</a:t>
+            </a:r>
+            <a:r>
+              <a:rPr lang="fr-FR" baseline="0" smtClean="0"/>
+              <a:t> shed</a:t>
+            </a:r>
+          </a:p>
+          <a:p>
+            <a:pPr marL="171450" indent="-171450">
+              <a:buFontTx/>
+              <a:buChar char="-"/>
+            </a:pPr>
+            <a:r>
+              <a:rPr lang="fr-FR" baseline="0" smtClean="0"/>
+              <a:t>Distance </a:t>
+            </a:r>
+            <a:r>
+              <a:rPr lang="fr-FR" baseline="0" dirty="0" smtClean="0"/>
+              <a:t>de 3km</a:t>
+            </a:r>
+          </a:p>
+          <a:p>
+            <a:endParaRPr lang="fr-FR" dirty="0"/>
+          </a:p>
+        </p:txBody>
+      </p:sp>
+      <p:sp>
+        <p:nvSpPr>
+          <p:cNvPr id="4" name="Espace réservé du numéro de diapositive 3"/>
+          <p:cNvSpPr>
+            <a:spLocks noGrp="1"/>
+          </p:cNvSpPr>
+          <p:nvPr>
+            <p:ph type="sldNum" sz="quarter" idx="10"/>
+          </p:nvPr>
+        </p:nvSpPr>
+        <p:spPr/>
+        <p:txBody>
+          <a:bodyPr/>
+          <a:lstStyle/>
+          <a:p>
+            <a:fld id="{7FED9F59-E5F7-4D0D-AFB1-35ABD0360038}" type="slidenum">
+              <a:rPr lang="fr-FR" smtClean="0"/>
+              <a:t>18</a:t>
+            </a:fld>
+            <a:endParaRPr lang="fr-FR"/>
+          </a:p>
+        </p:txBody>
+      </p:sp>
+    </p:spTree>
+    <p:extLst>
+      <p:ext uri="{BB962C8B-B14F-4D97-AF65-F5344CB8AC3E}">
+        <p14:creationId xmlns:p14="http://schemas.microsoft.com/office/powerpoint/2010/main" val="3722148337"/>
+      </p:ext>
+    </p:extLst>
+  </p:cSld>
+  <p:clrMapOvr>
+    <a:masterClrMapping/>
+  </p:clrMapOvr>
+</p:notes>
+</file>
+
 <file path=ppt/notesSlides/notesSlide2.xml><?xml version="1.0" encoding="utf-8"?>
 <p:notes xmlns:a="http://schemas.openxmlformats.org/drawingml/2006/main" xmlns:r="http://schemas.openxmlformats.org/officeDocument/2006/relationships" xmlns:p="http://schemas.openxmlformats.org/presentationml/2006/main">
   <p:cSld>
@@ -616,67 +928,6 @@
               <a:buFontTx/>
               <a:buNone/>
             </a:pPr>
-            <a:r>
-              <a:rPr lang="fr-FR" baseline="0" dirty="0" smtClean="0"/>
-              <a:t>1) Placer la PLAE</a:t>
-            </a:r>
-          </a:p>
-          <a:p>
-            <a:pPr marL="171450" indent="-171450">
-              <a:buFontTx/>
-              <a:buChar char="-"/>
-            </a:pPr>
-            <a:r>
-              <a:rPr lang="fr-FR" baseline="0" dirty="0" smtClean="0"/>
-              <a:t>Activer l’outil numériseur</a:t>
-            </a:r>
-          </a:p>
-          <a:p>
-            <a:pPr marL="171450" marR="0" lvl="0" indent="-171450" algn="l" defTabSz="914400" rtl="0" eaLnBrk="1" fontAlgn="auto" latinLnBrk="0" hangingPunct="1">
-              <a:lnSpc>
-                <a:spcPct val="100000"/>
-              </a:lnSpc>
-              <a:spcBef>
-                <a:spcPts val="0"/>
-              </a:spcBef>
-              <a:spcAft>
-                <a:spcPts val="0"/>
-              </a:spcAft>
-              <a:buClrTx/>
-              <a:buSzTx/>
-              <a:buFontTx/>
-              <a:buChar char="-"/>
-              <a:tabLst/>
-              <a:defRPr/>
-            </a:pPr>
-            <a:r>
-              <a:rPr lang="fr-FR" baseline="0" dirty="0" smtClean="0"/>
-              <a:t>Sur la carte, clic droit -&gt; Créer des entités de Point -&gt; Créer un point sur une position</a:t>
-            </a:r>
-          </a:p>
-          <a:p>
-            <a:pPr marL="171450" indent="-171450">
-              <a:buFontTx/>
-              <a:buChar char="-"/>
-            </a:pPr>
-            <a:r>
-              <a:rPr lang="fr-FR" baseline="0" dirty="0" smtClean="0"/>
-              <a:t>Si besoin, utiliser l’outil bonus/</a:t>
-            </a:r>
-            <a:r>
-              <a:rPr lang="fr-FR" b="1" baseline="0" dirty="0" smtClean="0"/>
-              <a:t>convertisseur.xlsm</a:t>
-            </a:r>
-            <a:r>
-              <a:rPr lang="fr-FR" baseline="0" dirty="0" smtClean="0"/>
-              <a:t> pour convertir les coordonnées degrés/min/sec en décimales ou inversement</a:t>
-            </a:r>
-          </a:p>
-          <a:p>
-            <a:pPr marL="171450" indent="-171450">
-              <a:buFontTx/>
-              <a:buChar char="-"/>
-            </a:pPr>
             <a:endParaRPr lang="fr-FR" baseline="0" dirty="0" smtClean="0"/>
           </a:p>
           <a:p>
@@ -684,61 +935,6 @@
               <a:buFontTx/>
               <a:buNone/>
             </a:pPr>
-            <a:r>
-              <a:rPr lang="fr-FR" baseline="0" dirty="0" smtClean="0"/>
-              <a:t>2) Outil BDD_GONIO</a:t>
-            </a:r>
-          </a:p>
-          <a:p>
-            <a:pPr marL="171450" indent="-171450">
-              <a:buFontTx/>
-              <a:buChar char="-"/>
-            </a:pPr>
-            <a:r>
-              <a:rPr lang="fr-FR" baseline="0" dirty="0" smtClean="0"/>
-              <a:t>Ouvrir le fichier bonus/BDD_GONIO_V9.xlsm</a:t>
-            </a:r>
-          </a:p>
-          <a:p>
-            <a:pPr marL="171450" indent="-171450">
-              <a:buFontTx/>
-              <a:buChar char="-"/>
-            </a:pPr>
-            <a:r>
-              <a:rPr lang="fr-FR" baseline="0" dirty="0" smtClean="0"/>
-              <a:t>Remplir le fichier en indiquant le capteur, la position capteur (DMS ou décimales) et l’azimut</a:t>
-            </a:r>
-          </a:p>
-          <a:p>
-            <a:pPr marL="0" indent="0">
-              <a:buFontTx/>
-              <a:buNone/>
-            </a:pPr>
-            <a:endParaRPr lang="fr-FR" baseline="0" dirty="0" smtClean="0"/>
-          </a:p>
-          <a:p>
-            <a:pPr marL="0" indent="0">
-              <a:buFontTx/>
-              <a:buNone/>
-            </a:pPr>
-            <a:r>
-              <a:rPr lang="fr-FR" baseline="0" dirty="0" smtClean="0"/>
-              <a:t>3) Cliquer sur « Générer le fichier KML »</a:t>
-            </a:r>
-          </a:p>
-          <a:p>
-            <a:pPr marL="171450" indent="-171450">
-              <a:buFontTx/>
-              <a:buChar char="-"/>
-            </a:pPr>
-            <a:r>
-              <a:rPr lang="fr-FR" baseline="0" dirty="0" smtClean="0"/>
-              <a:t>Glisser le fichier KML dans </a:t>
-            </a:r>
-            <a:r>
-              <a:rPr lang="fr-FR" baseline="0" dirty="0" err="1" smtClean="0"/>
-              <a:t>GlobalMapper</a:t>
-            </a:r>
             <a:endParaRPr lang="fr-FR" baseline="0" dirty="0" smtClean="0"/>
           </a:p>
         </p:txBody>
@@ -769,7 +965,7 @@
     </p:spTree>
     <p:extLst>
       <p:ext uri="{BB962C8B-B14F-4D97-AF65-F5344CB8AC3E}">
-        <p14:creationId xmlns:p14="http://schemas.microsoft.com/office/powerpoint/2010/main" val="25088329"/>
+        <p14:creationId xmlns:p14="http://schemas.microsoft.com/office/powerpoint/2010/main" val="1632032232"/>
       </p:ext>
     </p:extLst>
   </p:cSld>
@@ -828,79 +1024,12 @@
           <a:bodyPr/>
           <a:lstStyle/>
           <a:p>
-            <a:pPr marL="228600" indent="-228600">
-              <a:buFontTx/>
-              <a:buAutoNum type="arabicParenR"/>
-            </a:pPr>
-            <a:r>
-              <a:rPr lang="fr-FR" baseline="0" dirty="0" smtClean="0"/>
-              <a:t>Dessiner une box</a:t>
-            </a:r>
-          </a:p>
-          <a:p>
-            <a:pPr marL="171450" indent="-171450">
-              <a:buFontTx/>
-              <a:buChar char="-"/>
-            </a:pPr>
-            <a:r>
-              <a:rPr lang="fr-FR" baseline="0" dirty="0" smtClean="0"/>
-              <a:t>Utiliser l’outil de création de rectangle</a:t>
-            </a:r>
-          </a:p>
-          <a:p>
-            <a:pPr marL="171450" indent="-171450">
-              <a:buFontTx/>
-              <a:buChar char="-"/>
-            </a:pPr>
-            <a:r>
-              <a:rPr lang="fr-FR" baseline="0" dirty="0" smtClean="0"/>
-              <a:t>Ou Activer l’outil numériseur</a:t>
-            </a:r>
-          </a:p>
-          <a:p>
-            <a:pPr marL="171450" indent="-171450">
-              <a:buFontTx/>
-              <a:buChar char="-"/>
-            </a:pPr>
-            <a:r>
-              <a:rPr lang="fr-FR" baseline="0" dirty="0" smtClean="0"/>
-              <a:t>Sur la carte, clic droit -&gt; Créer une entité de surface -&gt; Créer une surface rectangulaire</a:t>
-            </a:r>
-          </a:p>
-          <a:p>
-            <a:pPr marL="171450" indent="-171450">
-              <a:buFontTx/>
-              <a:buChar char="-"/>
-            </a:pPr>
-            <a:r>
-              <a:rPr lang="fr-FR" baseline="0" dirty="0" smtClean="0"/>
-              <a:t>Définir le style hachure rouge</a:t>
-            </a:r>
-          </a:p>
-          <a:p>
             <a:pPr marL="0" indent="0">
               <a:buFontTx/>
               <a:buNone/>
             </a:pPr>
             <a:endParaRPr lang="fr-FR" baseline="0" dirty="0" smtClean="0"/>
           </a:p>
-          <a:p>
-            <a:pPr marL="0" indent="0">
-              <a:buFontTx/>
-              <a:buNone/>
-            </a:pPr>
-            <a:r>
-              <a:rPr lang="fr-FR" baseline="0" dirty="0" smtClean="0"/>
-              <a:t>2) Tracer une FLOT</a:t>
-            </a:r>
-          </a:p>
-          <a:p>
-            <a:pPr marL="0" indent="0">
-              <a:buFontTx/>
-              <a:buNone/>
-            </a:pPr>
-            <a:endParaRPr lang="fr-FR" baseline="0" dirty="0" smtClean="0"/>
-          </a:p>
         </p:txBody>
       </p:sp>
       <p:sp>
@@ -920,7 +1049,7 @@
           <a:p>
             <a:fld id="{7FED9F59-E5F7-4D0D-AFB1-35ABD0360038}" type="slidenum">
               <a:rPr lang="fr-FR" smtClean="0"/>
-              <a:t>4</a:t>
+              <a:t>5</a:t>
             </a:fld>
             <a:endParaRPr lang="fr-FR"/>
           </a:p>
@@ -929,7 +1058,7 @@
     </p:spTree>
     <p:extLst>
       <p:ext uri="{BB962C8B-B14F-4D97-AF65-F5344CB8AC3E}">
-        <p14:creationId xmlns:p14="http://schemas.microsoft.com/office/powerpoint/2010/main" val="3917534212"/>
+        <p14:creationId xmlns:p14="http://schemas.microsoft.com/office/powerpoint/2010/main" val="1996996555"/>
       </p:ext>
     </p:extLst>
   </p:cSld>
@@ -966,7 +1095,12 @@
             <p:ph type="sldImg"/>
           </p:nvPr>
         </p:nvSpPr>
-        <p:spPr/>
+        <p:spPr>
+          <a:xfrm>
+            <a:off x="685800" y="1143000"/>
+            <a:ext cx="5486400" cy="3086100"/>
+          </a:xfrm>
+        </p:spPr>
       </p:sp>
       <p:sp>
         <p:nvSpPr>
@@ -983,31 +1117,13 @@
           <a:bodyPr/>
           <a:lstStyle/>
           <a:p>
-            <a:pPr marL="228600" indent="-228600">
-              <a:buAutoNum type="arabicParenR"/>
+            <a:pPr marL="0" indent="0">
+              <a:buFontTx/>
+              <a:buNone/>
             </a:pPr>
             <a:r>
-              <a:rPr lang="fr-FR" dirty="0" smtClean="0"/>
-              <a:t>Importer le vecteur</a:t>
-            </a:r>
-          </a:p>
-          <a:p>
-            <a:pPr marL="228600" indent="-228600">
-              <a:buAutoNum type="arabicParenR"/>
-            </a:pPr>
-            <a:endParaRPr lang="fr-FR" dirty="0" smtClean="0"/>
-          </a:p>
-          <a:p>
-            <a:pPr marL="228600" indent="-228600">
-              <a:buAutoNum type="arabicParenR"/>
-            </a:pPr>
-            <a:r>
-              <a:rPr lang="fr-FR" dirty="0" smtClean="0"/>
-              <a:t>Créer</a:t>
-            </a:r>
-            <a:r>
               <a:rPr lang="fr-FR" baseline="0" dirty="0" smtClean="0"/>
-              <a:t> une carte de chaleur</a:t>
+              <a:t>1) Placer la PLAE</a:t>
             </a:r>
           </a:p>
           <a:p>
@@ -1016,28 +1132,31 @@
               <a:buChar char="-"/>
             </a:pPr>
             <a:r>
-              <a:rPr lang="fr-FR" baseline="0" smtClean="0"/>
-              <a:t>Sur </a:t>
-            </a:r>
-            <a:r>
               <a:rPr lang="fr-FR" baseline="0" dirty="0" smtClean="0"/>
-              <a:t>la couche </a:t>
-            </a:r>
-            <a:r>
-              <a:rPr lang="fr-FR" baseline="0" dirty="0" err="1" smtClean="0"/>
-              <a:t>villes_alsace</a:t>
-            </a:r>
+              <a:t>Activer l’outil numériseur</a:t>
+            </a:r>
+          </a:p>
+          <a:p>
+            <a:pPr marL="171450" marR="0" lvl="0" indent="-171450" algn="l" defTabSz="914400" rtl="0" eaLnBrk="1" fontAlgn="auto" latinLnBrk="0" hangingPunct="1">
+              <a:lnSpc>
+                <a:spcPct val="100000"/>
+              </a:lnSpc>
+              <a:spcBef>
+                <a:spcPts val="0"/>
+              </a:spcBef>
+              <a:spcAft>
+                <a:spcPts val="0"/>
+              </a:spcAft>
+              <a:buClrTx/>
+              <a:buSzTx/>
+              <a:buFontTx/>
+              <a:buChar char="-"/>
+              <a:tabLst/>
+              <a:defRPr/>
+            </a:pPr>
             <a:r>
               <a:rPr lang="fr-FR" baseline="0" dirty="0" smtClean="0"/>
-              <a:t>, clic droit -&gt; </a:t>
-            </a:r>
-            <a:r>
-              <a:rPr lang="fr-FR" baseline="0" dirty="0" err="1" smtClean="0"/>
-              <a:t>Analysis</a:t>
-            </a:r>
-            <a:r>
-              <a:rPr lang="fr-FR" baseline="0" dirty="0" smtClean="0"/>
-              <a:t> -&gt; DENSITY</a:t>
+              <a:t>Sur la carte, clic droit -&gt; Créer des entités de Point -&gt; Créer un point sur une position</a:t>
             </a:r>
           </a:p>
           <a:p>
@@ -1047,15 +1166,15 @@
             </a:pPr>
             <a:r>
               <a:rPr lang="fr-FR" baseline="0" dirty="0" smtClean="0"/>
-              <a:t>Si besoin augmenter le paramètre « </a:t>
-            </a:r>
-            <a:r>
-              <a:rPr lang="fr-FR" baseline="0" dirty="0" err="1" smtClean="0"/>
-              <a:t>Search</a:t>
+              <a:t>Si besoin, utiliser l’outil bonus/</a:t>
+            </a:r>
+            <a:r>
+              <a:rPr lang="fr-FR" b="1" baseline="0" dirty="0" smtClean="0"/>
+              <a:t>convertisseur.xlsm</a:t>
             </a:r>
             <a:r>
               <a:rPr lang="fr-FR" baseline="0" dirty="0" smtClean="0"/>
-              <a:t> radius » pour augmenter la sensibilité</a:t>
+              <a:t> pour convertir les coordonnées degrés/min/sec en décimales ou inversement</a:t>
             </a:r>
           </a:p>
           <a:p>
@@ -1063,26 +1182,70 @@
               <a:buFontTx/>
               <a:buChar char="-"/>
             </a:pPr>
+            <a:endParaRPr lang="fr-FR" baseline="0" dirty="0" smtClean="0"/>
+          </a:p>
+          <a:p>
+            <a:pPr marL="0" indent="0">
+              <a:buFontTx/>
+              <a:buNone/>
+            </a:pPr>
+            <a:r>
+              <a:rPr lang="fr-FR" baseline="0" dirty="0" smtClean="0"/>
+              <a:t>2) Outil BDD_GONIO</a:t>
+            </a:r>
+          </a:p>
+          <a:p>
+            <a:pPr marL="171450" indent="-171450">
+              <a:buFontTx/>
+              <a:buChar char="-"/>
+            </a:pPr>
+            <a:r>
+              <a:rPr lang="fr-FR" baseline="0" dirty="0" smtClean="0"/>
+              <a:t>Ouvrir le fichier bonus/BDD_GONIO_V9.xlsm</a:t>
+            </a:r>
+          </a:p>
+          <a:p>
+            <a:pPr marL="171450" indent="-171450">
+              <a:buFontTx/>
+              <a:buChar char="-"/>
+            </a:pPr>
+            <a:r>
+              <a:rPr lang="fr-FR" baseline="0" dirty="0" smtClean="0"/>
+              <a:t>Remplir le fichier en indiquant le capteur, la position capteur (DMS ou décimales) et l’azimut</a:t>
+            </a:r>
+          </a:p>
+          <a:p>
+            <a:pPr marL="0" indent="0">
+              <a:buFontTx/>
+              <a:buNone/>
+            </a:pPr>
+            <a:endParaRPr lang="fr-FR" baseline="0" dirty="0" smtClean="0"/>
+          </a:p>
+          <a:p>
+            <a:pPr marL="0" indent="0">
+              <a:buFontTx/>
+              <a:buNone/>
+            </a:pPr>
+            <a:r>
+              <a:rPr lang="fr-FR" baseline="0" dirty="0" smtClean="0"/>
+              <a:t>3) Cliquer sur « Générer le fichier KML »</a:t>
+            </a:r>
+          </a:p>
+          <a:p>
+            <a:pPr marL="171450" indent="-171450">
+              <a:buFontTx/>
+              <a:buChar char="-"/>
+            </a:pPr>
+            <a:r>
+              <a:rPr lang="fr-FR" baseline="0" dirty="0" smtClean="0"/>
+              <a:t>Glisser le fichier KML dans </a:t>
+            </a:r>
             <a:r>
               <a:rPr lang="fr-FR" baseline="0" dirty="0" err="1" smtClean="0"/>
-              <a:t>Shader</a:t>
-            </a:r>
-            <a:r>
-              <a:rPr lang="fr-FR" baseline="0" dirty="0" smtClean="0"/>
-              <a:t> : Mettre Atlas </a:t>
-            </a:r>
-            <a:r>
-              <a:rPr lang="fr-FR" baseline="0" dirty="0" err="1" smtClean="0"/>
-              <a:t>shader</a:t>
+              <a:t>GlobalMapper</a:t>
             </a:r>
             <a:endParaRPr lang="fr-FR" baseline="0" dirty="0" smtClean="0"/>
           </a:p>
-          <a:p>
-            <a:pPr marL="228600" indent="-228600">
-              <a:buAutoNum type="arabicParenR"/>
-            </a:pPr>
-            <a:endParaRPr lang="fr-FR" dirty="0"/>
-          </a:p>
         </p:txBody>
       </p:sp>
       <p:sp>
@@ -1102,7 +1265,7 @@
           <a:p>
             <a:fld id="{7FED9F59-E5F7-4D0D-AFB1-35ABD0360038}" type="slidenum">
               <a:rPr lang="fr-FR" smtClean="0"/>
-              <a:t>5</a:t>
+              <a:t>7</a:t>
             </a:fld>
             <a:endParaRPr lang="fr-FR"/>
           </a:p>
@@ -1111,7 +1274,7 @@
     </p:spTree>
     <p:extLst>
       <p:ext uri="{BB962C8B-B14F-4D97-AF65-F5344CB8AC3E}">
-        <p14:creationId xmlns:p14="http://schemas.microsoft.com/office/powerpoint/2010/main" val="505178715"/>
+        <p14:creationId xmlns:p14="http://schemas.microsoft.com/office/powerpoint/2010/main" val="25088329"/>
       </p:ext>
     </p:extLst>
   </p:cSld>
@@ -1171,15 +1334,12 @@
           <a:lstStyle/>
           <a:p>
             <a:pPr marL="228600" indent="-228600">
+              <a:buFontTx/>
               <a:buAutoNum type="arabicParenR"/>
             </a:pPr>
             <a:r>
-              <a:rPr lang="fr-FR" dirty="0" smtClean="0"/>
-              <a:t>Trouver</a:t>
-            </a:r>
-            <a:r>
               <a:rPr lang="fr-FR" baseline="0" dirty="0" smtClean="0"/>
-              <a:t> le point côté 228</a:t>
+              <a:t>Dessiner une box</a:t>
             </a:r>
           </a:p>
           <a:p>
@@ -1189,29 +1349,17 @@
             </a:pPr>
             <a:r>
               <a:rPr lang="fr-FR" baseline="0" dirty="0" smtClean="0"/>
-              <a:t>A environ 980m, 274° du centre de </a:t>
-            </a:r>
-            <a:r>
-              <a:rPr lang="fr-FR" baseline="0" dirty="0" err="1" smtClean="0"/>
-              <a:t>Printzheim</a:t>
-            </a:r>
-            <a:endParaRPr lang="fr-FR" baseline="0" dirty="0" smtClean="0"/>
+              <a:t>Utiliser l’outil de création de rectangle</a:t>
+            </a:r>
           </a:p>
           <a:p>
             <a:pPr marL="171450" indent="-171450">
               <a:buFontTx/>
               <a:buChar char="-"/>
             </a:pPr>
-            <a:endParaRPr lang="fr-FR" baseline="0" dirty="0" smtClean="0"/>
-          </a:p>
-          <a:p>
-            <a:pPr marL="0" indent="0">
-              <a:buFontTx/>
-              <a:buNone/>
-            </a:pPr>
             <a:r>
               <a:rPr lang="fr-FR" baseline="0" dirty="0" smtClean="0"/>
-              <a:t>2) Créer un point</a:t>
+              <a:t>Ou Activer l’outil numériseur</a:t>
             </a:r>
           </a:p>
           <a:p>
@@ -1221,7 +1369,7 @@
             </a:pPr>
             <a:r>
               <a:rPr lang="fr-FR" baseline="0" dirty="0" smtClean="0"/>
-              <a:t>Utiliser l’outil Création ou de point</a:t>
+              <a:t>Sur la carte, clic droit -&gt; Créer une entité de surface -&gt; Créer une surface rectangulaire</a:t>
             </a:r>
           </a:p>
           <a:p>
@@ -1231,27 +1379,7 @@
             </a:pPr>
             <a:r>
               <a:rPr lang="fr-FR" baseline="0" dirty="0" smtClean="0"/>
-              <a:t>Ou sélectionner l’outil numériseur</a:t>
-            </a:r>
-          </a:p>
-          <a:p>
-            <a:pPr marL="171450" indent="-171450">
-              <a:buFontTx/>
-              <a:buChar char="-"/>
-            </a:pPr>
-            <a:r>
-              <a:rPr lang="fr-FR" baseline="0" dirty="0" smtClean="0"/>
-              <a:t>Sur la carte, clic droit -&gt; Créer une entité de point</a:t>
-            </a:r>
-          </a:p>
-          <a:p>
-            <a:pPr marL="171450" indent="-171450">
-              <a:buFontTx/>
-              <a:buChar char="-"/>
-            </a:pPr>
-            <a:r>
-              <a:rPr lang="fr-FR" baseline="0" dirty="0" smtClean="0"/>
-              <a:t>Sélectionner la couche « Créer une nouvelle couche »</a:t>
+              <a:t>Définir le style hachure rouge</a:t>
             </a:r>
           </a:p>
           <a:p>
@@ -1268,33 +1396,8 @@
             </a:pPr>
             <a:r>
               <a:rPr lang="fr-FR" baseline="0" dirty="0" smtClean="0"/>
-              <a:t>3) Localiser le croisement en T</a:t>
-            </a:r>
-          </a:p>
-          <a:p>
-            <a:pPr marL="171450" indent="-171450">
-              <a:buFontTx/>
-              <a:buChar char="-"/>
-            </a:pPr>
-            <a:r>
-              <a:rPr lang="fr-FR" baseline="0" dirty="0" smtClean="0"/>
-              <a:t>Utiliser l’outil mesure ou le COGO</a:t>
-            </a:r>
-          </a:p>
-          <a:p>
-            <a:pPr marL="171450" indent="-171450">
-              <a:buFontTx/>
-              <a:buChar char="-"/>
-            </a:pPr>
-            <a:r>
-              <a:rPr lang="fr-FR" baseline="0" dirty="0" smtClean="0"/>
-              <a:t>Le croisement est en </a:t>
-            </a:r>
-            <a:r>
-              <a:rPr lang="pl-PL" baseline="0" dirty="0" smtClean="0"/>
-              <a:t>32 U LV 85091 04483</a:t>
-            </a:r>
-            <a:endParaRPr lang="fr-FR" baseline="0" dirty="0" smtClean="0"/>
+              <a:t>2) Tracer une FLOT</a:t>
+            </a:r>
           </a:p>
           <a:p>
             <a:pPr marL="0" indent="0">
@@ -1303,66 +1406,6 @@
             </a:pPr>
             <a:endParaRPr lang="fr-FR" baseline="0" dirty="0" smtClean="0"/>
           </a:p>
-          <a:p>
-            <a:pPr marL="0" indent="0">
-              <a:buFontTx/>
-              <a:buNone/>
-            </a:pPr>
-            <a:r>
-              <a:rPr lang="fr-FR" baseline="0" dirty="0" smtClean="0"/>
-              <a:t>4) Dessiner une ellipse</a:t>
-            </a:r>
-          </a:p>
-          <a:p>
-            <a:pPr marL="171450" indent="-171450">
-              <a:buFontTx/>
-              <a:buChar char="-"/>
-            </a:pPr>
-            <a:r>
-              <a:rPr lang="fr-FR" baseline="0" dirty="0" smtClean="0"/>
-              <a:t>Utiliser l’outil de création de cercle / ellipse</a:t>
-            </a:r>
-          </a:p>
-          <a:p>
-            <a:pPr marL="171450" indent="-171450">
-              <a:buFontTx/>
-              <a:buChar char="-"/>
-            </a:pPr>
-            <a:r>
-              <a:rPr lang="fr-FR" baseline="0" dirty="0" smtClean="0"/>
-              <a:t>Ou passer par l’outil numériseur</a:t>
-            </a:r>
-          </a:p>
-          <a:p>
-            <a:pPr marL="171450" marR="0" indent="-171450" algn="l" defTabSz="914400" rtl="0" eaLnBrk="1" fontAlgn="auto" latinLnBrk="0" hangingPunct="1">
-              <a:lnSpc>
-                <a:spcPct val="100000"/>
-              </a:lnSpc>
-              <a:spcBef>
-                <a:spcPts val="0"/>
-              </a:spcBef>
-              <a:spcAft>
-                <a:spcPts val="0"/>
-              </a:spcAft>
-              <a:buClrTx/>
-              <a:buSzTx/>
-              <a:buFontTx/>
-              <a:buChar char="-"/>
-              <a:tabLst/>
-              <a:defRPr/>
-            </a:pPr>
-            <a:r>
-              <a:rPr lang="fr-FR" baseline="0" dirty="0" smtClean="0"/>
-              <a:t>Sur la carte, clic droit -&gt; Créer une entité de surface -&gt; Créer une surface circulaire</a:t>
-            </a:r>
-          </a:p>
-          <a:p>
-            <a:pPr marL="171450" indent="-171450">
-              <a:buFontTx/>
-              <a:buChar char="-"/>
-            </a:pPr>
-            <a:endParaRPr lang="fr-FR" dirty="0"/>
-          </a:p>
         </p:txBody>
       </p:sp>
       <p:sp>
@@ -1382,7 +1425,7 @@
           <a:p>
             <a:fld id="{7FED9F59-E5F7-4D0D-AFB1-35ABD0360038}" type="slidenum">
               <a:rPr lang="fr-FR" smtClean="0"/>
-              <a:t>7</a:t>
+              <a:t>8</a:t>
             </a:fld>
             <a:endParaRPr lang="fr-FR"/>
           </a:p>
@@ -1391,7 +1434,7 @@
     </p:spTree>
     <p:extLst>
       <p:ext uri="{BB962C8B-B14F-4D97-AF65-F5344CB8AC3E}">
-        <p14:creationId xmlns:p14="http://schemas.microsoft.com/office/powerpoint/2010/main" val="4184430103"/>
+        <p14:creationId xmlns:p14="http://schemas.microsoft.com/office/powerpoint/2010/main" val="3917534212"/>
       </p:ext>
     </p:extLst>
   </p:cSld>
@@ -1428,12 +1471,7 @@
             <p:ph type="sldImg"/>
           </p:nvPr>
         </p:nvSpPr>
-        <p:spPr>
-          <a:xfrm>
-            <a:off x="685800" y="1143000"/>
-            <a:ext cx="5486400" cy="3086100"/>
-          </a:xfrm>
-        </p:spPr>
+        <p:spPr/>
       </p:sp>
       <p:sp>
         <p:nvSpPr>
@@ -1450,18 +1488,32 @@
           <a:bodyPr/>
           <a:lstStyle/>
           <a:p>
-            <a:pPr marL="0" indent="0">
-              <a:buNone/>
+            <a:pPr marL="228600" indent="-228600">
+              <a:buAutoNum type="arabicParenR"/>
             </a:pPr>
             <a:r>
               <a:rPr lang="fr-FR" dirty="0" smtClean="0"/>
-              <a:t>1) </a:t>
-            </a:r>
+              <a:t>Importer le vecteur</a:t>
+            </a:r>
+          </a:p>
+          <a:p>
+            <a:pPr marL="228600" indent="-228600">
+              <a:buAutoNum type="arabicParenR"/>
+            </a:pPr>
+            <a:endParaRPr lang="fr-FR" dirty="0" smtClean="0"/>
+          </a:p>
+          <a:p>
+            <a:pPr marL="228600" indent="-228600">
+              <a:buAutoNum type="arabicParenR"/>
+            </a:pPr>
             <a:r>
               <a:rPr lang="fr-FR" dirty="0" smtClean="0"/>
-              <a:t>Importer le symbole VAB</a:t>
-            </a:r>
-            <a:endParaRPr lang="fr-FR" baseline="0" dirty="0" smtClean="0"/>
+              <a:t>Créer</a:t>
+            </a:r>
+            <a:r>
+              <a:rPr lang="fr-FR" baseline="0" dirty="0" smtClean="0"/>
+              <a:t> une carte de chaleur</a:t>
+            </a:r>
           </a:p>
           <a:p>
             <a:pPr marL="171450" indent="-171450">
@@ -1469,8 +1521,28 @@
               <a:buChar char="-"/>
             </a:pPr>
             <a:r>
+              <a:rPr lang="fr-FR" baseline="0" smtClean="0"/>
+              <a:t>Sur </a:t>
+            </a:r>
+            <a:r>
               <a:rPr lang="fr-FR" baseline="0" dirty="0" smtClean="0"/>
-              <a:t>Menu Outil -&gt; Configurer</a:t>
+              <a:t>la couche </a:t>
+            </a:r>
+            <a:r>
+              <a:rPr lang="fr-FR" baseline="0" dirty="0" err="1" smtClean="0"/>
+              <a:t>villes_alsace</a:t>
+            </a:r>
+            <a:r>
+              <a:rPr lang="fr-FR" baseline="0" dirty="0" smtClean="0"/>
+              <a:t>, clic droit -&gt; </a:t>
+            </a:r>
+            <a:r>
+              <a:rPr lang="fr-FR" baseline="0" dirty="0" err="1" smtClean="0"/>
+              <a:t>Analysis</a:t>
+            </a:r>
+            <a:r>
+              <a:rPr lang="fr-FR" baseline="0" dirty="0" smtClean="0"/>
+              <a:t> -&gt; DENSITY</a:t>
             </a:r>
           </a:p>
           <a:p>
@@ -1480,7 +1552,15 @@
             </a:pPr>
             <a:r>
               <a:rPr lang="fr-FR" baseline="0" dirty="0" smtClean="0"/>
-              <a:t>Onglet « Style de point », sous menu « Symboles personnalisés »</a:t>
+              <a:t>Si besoin augmenter le paramètre « </a:t>
+            </a:r>
+            <a:r>
+              <a:rPr lang="fr-FR" baseline="0" dirty="0" err="1" smtClean="0"/>
+              <a:t>Search</a:t>
+            </a:r>
+            <a:r>
+              <a:rPr lang="fr-FR" baseline="0" dirty="0" smtClean="0"/>
+              <a:t> radius » pour augmenter la sensibilité</a:t>
             </a:r>
           </a:p>
           <a:p>
@@ -1489,280 +1569,22 @@
               <a:buChar char="-"/>
             </a:pPr>
             <a:r>
+              <a:rPr lang="fr-FR" baseline="0" dirty="0" err="1" smtClean="0"/>
+              <a:t>Shader</a:t>
+            </a:r>
+            <a:r>
               <a:rPr lang="fr-FR" baseline="0" dirty="0" smtClean="0"/>
-              <a:t>Ajouter un symbole</a:t>
-            </a:r>
-          </a:p>
-          <a:p>
-            <a:pPr marL="171450" indent="-171450">
-              <a:buFontTx/>
-              <a:buChar char="-"/>
-            </a:pPr>
-            <a:r>
-              <a:rPr lang="fr-FR" baseline="0" dirty="0" smtClean="0"/>
-              <a:t>Sélectionner l’image CARTO/import/VAB.jpg</a:t>
-            </a:r>
-          </a:p>
-          <a:p>
-            <a:pPr marL="171450" indent="-171450">
-              <a:buFontTx/>
-              <a:buChar char="-"/>
-            </a:pPr>
-            <a:r>
-              <a:rPr lang="fr-FR" baseline="0" dirty="0" smtClean="0"/>
-              <a:t>Nommer le symbole VAB, valider</a:t>
-            </a:r>
-          </a:p>
-          <a:p>
-            <a:pPr marL="0" indent="0">
-              <a:buFontTx/>
-              <a:buNone/>
-            </a:pPr>
+              <a:t> : Mettre Atlas </a:t>
+            </a:r>
+            <a:r>
+              <a:rPr lang="fr-FR" baseline="0" dirty="0" err="1" smtClean="0"/>
+              <a:t>shader</a:t>
+            </a:r>
             <a:endParaRPr lang="fr-FR" baseline="0" dirty="0" smtClean="0"/>
           </a:p>
           <a:p>
-            <a:pPr marL="0" indent="0">
-              <a:buFontTx/>
-              <a:buNone/>
-            </a:pPr>
-            <a:r>
-              <a:rPr lang="fr-FR" baseline="0" dirty="0" smtClean="0"/>
-              <a:t>2) </a:t>
-            </a:r>
-            <a:r>
-              <a:rPr lang="fr-FR" dirty="0" smtClean="0"/>
-              <a:t>Créer le style</a:t>
-            </a:r>
-            <a:r>
-              <a:rPr lang="fr-FR" baseline="0" dirty="0" smtClean="0"/>
-              <a:t> de point SAEB</a:t>
-            </a:r>
-          </a:p>
-          <a:p>
-            <a:pPr marL="171450" marR="0" indent="-171450" algn="l" defTabSz="914400" rtl="0" eaLnBrk="1" fontAlgn="auto" latinLnBrk="0" hangingPunct="1">
-              <a:lnSpc>
-                <a:spcPct val="100000"/>
-              </a:lnSpc>
-              <a:spcBef>
-                <a:spcPts val="0"/>
-              </a:spcBef>
-              <a:spcAft>
-                <a:spcPts val="0"/>
-              </a:spcAft>
-              <a:buClrTx/>
-              <a:buSzTx/>
-              <a:buFontTx/>
-              <a:buChar char="-"/>
-              <a:tabLst/>
-              <a:defRPr/>
-            </a:pPr>
-            <a:r>
-              <a:rPr lang="fr-FR" baseline="0" dirty="0" smtClean="0"/>
-              <a:t>Onglet « Style de point », sous menu « style de point »</a:t>
-            </a:r>
-          </a:p>
-          <a:p>
-            <a:pPr marL="171450" marR="0" indent="-171450" algn="l" defTabSz="914400" rtl="0" eaLnBrk="1" fontAlgn="auto" latinLnBrk="0" hangingPunct="1">
-              <a:lnSpc>
-                <a:spcPct val="100000"/>
-              </a:lnSpc>
-              <a:spcBef>
-                <a:spcPts val="0"/>
-              </a:spcBef>
-              <a:spcAft>
-                <a:spcPts val="0"/>
-              </a:spcAft>
-              <a:buClrTx/>
-              <a:buSzTx/>
-              <a:buFontTx/>
-              <a:buChar char="-"/>
-              <a:tabLst/>
-              <a:defRPr/>
-            </a:pPr>
-            <a:r>
-              <a:rPr lang="fr-FR" baseline="0" dirty="0" smtClean="0"/>
-              <a:t>Créer un nouveau type</a:t>
-            </a:r>
-          </a:p>
-          <a:p>
-            <a:pPr marL="171450" marR="0" indent="-171450" algn="l" defTabSz="914400" rtl="0" eaLnBrk="1" fontAlgn="auto" latinLnBrk="0" hangingPunct="1">
-              <a:lnSpc>
-                <a:spcPct val="100000"/>
-              </a:lnSpc>
-              <a:spcBef>
-                <a:spcPts val="0"/>
-              </a:spcBef>
-              <a:spcAft>
-                <a:spcPts val="0"/>
-              </a:spcAft>
-              <a:buClrTx/>
-              <a:buSzTx/>
-              <a:buFontTx/>
-              <a:buChar char="-"/>
-              <a:tabLst/>
-              <a:defRPr/>
-            </a:pPr>
-            <a:r>
-              <a:rPr lang="fr-FR" baseline="0" dirty="0" smtClean="0"/>
-              <a:t>Nommer le type SAEB, choisir le symbole VAB</a:t>
-            </a:r>
-          </a:p>
-          <a:p>
-            <a:pPr marL="171450" marR="0" indent="-171450" algn="l" defTabSz="914400" rtl="0" eaLnBrk="1" fontAlgn="auto" latinLnBrk="0" hangingPunct="1">
-              <a:lnSpc>
-                <a:spcPct val="100000"/>
-              </a:lnSpc>
-              <a:spcBef>
-                <a:spcPts val="0"/>
-              </a:spcBef>
-              <a:spcAft>
-                <a:spcPts val="0"/>
-              </a:spcAft>
-              <a:buClrTx/>
-              <a:buSzTx/>
-              <a:buFontTx/>
-              <a:buChar char="-"/>
-              <a:tabLst/>
-              <a:defRPr/>
-            </a:pPr>
-            <a:endParaRPr lang="fr-FR" baseline="0" dirty="0" smtClean="0"/>
-          </a:p>
-          <a:p>
-            <a:pPr marL="0" marR="0" indent="0" algn="l" defTabSz="914400" rtl="0" eaLnBrk="1" fontAlgn="auto" latinLnBrk="0" hangingPunct="1">
-              <a:lnSpc>
-                <a:spcPct val="100000"/>
-              </a:lnSpc>
-              <a:spcBef>
-                <a:spcPts val="0"/>
-              </a:spcBef>
-              <a:spcAft>
-                <a:spcPts val="0"/>
-              </a:spcAft>
-              <a:buClrTx/>
-              <a:buSzTx/>
-              <a:buFontTx/>
-              <a:buNone/>
-              <a:tabLst/>
-              <a:defRPr/>
-            </a:pPr>
-            <a:r>
-              <a:rPr lang="fr-FR" baseline="0" dirty="0" smtClean="0"/>
-              <a:t>3) </a:t>
-            </a:r>
-            <a:r>
-              <a:rPr lang="fr-FR" baseline="0" dirty="0" smtClean="0"/>
-              <a:t>Définir le style de point SAEB</a:t>
-            </a:r>
-          </a:p>
-          <a:p>
-            <a:pPr marL="171450" marR="0" indent="-171450" algn="l" defTabSz="914400" rtl="0" eaLnBrk="1" fontAlgn="auto" latinLnBrk="0" hangingPunct="1">
-              <a:lnSpc>
-                <a:spcPct val="100000"/>
-              </a:lnSpc>
-              <a:spcBef>
-                <a:spcPts val="0"/>
-              </a:spcBef>
-              <a:spcAft>
-                <a:spcPts val="0"/>
-              </a:spcAft>
-              <a:buClrTx/>
-              <a:buSzTx/>
-              <a:buFontTx/>
-              <a:buChar char="-"/>
-              <a:tabLst/>
-              <a:defRPr/>
-            </a:pPr>
-            <a:r>
-              <a:rPr lang="fr-FR" baseline="0" dirty="0" smtClean="0"/>
-              <a:t>Sélectionner l’outil numériseur</a:t>
-            </a:r>
-          </a:p>
-          <a:p>
-            <a:pPr marL="171450" marR="0" indent="-171450" algn="l" defTabSz="914400" rtl="0" eaLnBrk="1" fontAlgn="auto" latinLnBrk="0" hangingPunct="1">
-              <a:lnSpc>
-                <a:spcPct val="100000"/>
-              </a:lnSpc>
-              <a:spcBef>
-                <a:spcPts val="0"/>
-              </a:spcBef>
-              <a:spcAft>
-                <a:spcPts val="0"/>
-              </a:spcAft>
-              <a:buClrTx/>
-              <a:buSzTx/>
-              <a:buFontTx/>
-              <a:buChar char="-"/>
-              <a:tabLst/>
-              <a:defRPr/>
-            </a:pPr>
-            <a:r>
-              <a:rPr lang="fr-FR" baseline="0" dirty="0" smtClean="0"/>
-              <a:t>Sélectionner le point SAEB</a:t>
-            </a:r>
-          </a:p>
-          <a:p>
-            <a:pPr marL="171450" marR="0" indent="-171450" algn="l" defTabSz="914400" rtl="0" eaLnBrk="1" fontAlgn="auto" latinLnBrk="0" hangingPunct="1">
-              <a:lnSpc>
-                <a:spcPct val="100000"/>
-              </a:lnSpc>
-              <a:spcBef>
-                <a:spcPts val="0"/>
-              </a:spcBef>
-              <a:spcAft>
-                <a:spcPts val="0"/>
-              </a:spcAft>
-              <a:buClrTx/>
-              <a:buSzTx/>
-              <a:buFontTx/>
-              <a:buChar char="-"/>
-              <a:tabLst/>
-              <a:defRPr/>
-            </a:pPr>
-            <a:r>
-              <a:rPr lang="fr-FR" baseline="0" dirty="0" smtClean="0"/>
-              <a:t>Clic droit -&gt; Modifier l’entité</a:t>
-            </a:r>
-          </a:p>
-          <a:p>
-            <a:pPr marL="171450" marR="0" indent="-171450" algn="l" defTabSz="914400" rtl="0" eaLnBrk="1" fontAlgn="auto" latinLnBrk="0" hangingPunct="1">
-              <a:lnSpc>
-                <a:spcPct val="100000"/>
-              </a:lnSpc>
-              <a:spcBef>
-                <a:spcPts val="0"/>
-              </a:spcBef>
-              <a:spcAft>
-                <a:spcPts val="0"/>
-              </a:spcAft>
-              <a:buClrTx/>
-              <a:buSzTx/>
-              <a:buFontTx/>
-              <a:buChar char="-"/>
-              <a:tabLst/>
-              <a:defRPr/>
-            </a:pPr>
-            <a:r>
-              <a:rPr lang="fr-FR" baseline="0" dirty="0" smtClean="0"/>
-              <a:t>Définir le « type d’entité » sur SAEB</a:t>
-            </a:r>
-          </a:p>
-          <a:p>
-            <a:pPr marL="0" marR="0" indent="0" algn="l" defTabSz="914400" rtl="0" eaLnBrk="1" fontAlgn="auto" latinLnBrk="0" hangingPunct="1">
-              <a:lnSpc>
-                <a:spcPct val="100000"/>
-              </a:lnSpc>
-              <a:spcBef>
-                <a:spcPts val="0"/>
-              </a:spcBef>
-              <a:spcAft>
-                <a:spcPts val="0"/>
-              </a:spcAft>
-              <a:buClrTx/>
-              <a:buSzTx/>
-              <a:buFontTx/>
-              <a:buNone/>
-              <a:tabLst/>
-              <a:defRPr/>
+            <a:pPr marL="228600" indent="-228600">
+              <a:buAutoNum type="arabicParenR"/>
             </a:pPr>
             <a:endParaRPr lang="fr-FR" dirty="0"/>
           </a:p>
@@ -1785,7 +1607,7 @@
           <a:p>
             <a:fld id="{7FED9F59-E5F7-4D0D-AFB1-35ABD0360038}" type="slidenum">
               <a:rPr lang="fr-FR" smtClean="0"/>
-              <a:t>8</a:t>
+              <a:t>9</a:t>
             </a:fld>
             <a:endParaRPr lang="fr-FR"/>
           </a:p>
@@ -1794,7 +1616,7 @@
     </p:spTree>
     <p:extLst>
       <p:ext uri="{BB962C8B-B14F-4D97-AF65-F5344CB8AC3E}">
-        <p14:creationId xmlns:p14="http://schemas.microsoft.com/office/powerpoint/2010/main" val="2997087999"/>
+        <p14:creationId xmlns:p14="http://schemas.microsoft.com/office/powerpoint/2010/main" val="505178715"/>
       </p:ext>
     </p:extLst>
   </p:cSld>
@@ -1854,184 +1676,197 @@
           <a:lstStyle/>
           <a:p>
             <a:pPr marL="228600" indent="-228600">
-              <a:buFontTx/>
               <a:buAutoNum type="arabicParenR"/>
             </a:pPr>
             <a:r>
+              <a:rPr lang="fr-FR" dirty="0" smtClean="0"/>
+              <a:t>Trouver</a:t>
+            </a:r>
+            <a:r>
               <a:rPr lang="fr-FR" baseline="0" dirty="0" smtClean="0"/>
-              <a:t>Tracer un itinéraire</a:t>
-            </a:r>
-          </a:p>
-          <a:p>
-            <a:pPr marL="171450" lvl="0" indent="-171450">
+              <a:t> le point côté 228</a:t>
+            </a:r>
+          </a:p>
+          <a:p>
+            <a:pPr marL="171450" indent="-171450">
               <a:buFontTx/>
               <a:buChar char="-"/>
             </a:pPr>
             <a:r>
               <a:rPr lang="fr-FR" baseline="0" dirty="0" smtClean="0"/>
-              <a:t>Placer un point sur le départ et l’arrivée :</a:t>
-            </a:r>
-          </a:p>
-          <a:p>
-            <a:pPr marL="171450" lvl="0" indent="-171450">
-              <a:buFontTx/>
-              <a:buChar char="-"/>
-            </a:pPr>
-            <a:r>
-              <a:rPr lang="fr-FR" baseline="0" dirty="0" smtClean="0"/>
-              <a:t>Activer l’outil numériseur</a:t>
-            </a:r>
-          </a:p>
-          <a:p>
-            <a:pPr marL="171450" lvl="0" indent="-171450">
-              <a:buFontTx/>
-              <a:buChar char="-"/>
-            </a:pPr>
-            <a:r>
-              <a:rPr lang="fr-FR" baseline="0" dirty="0" smtClean="0"/>
-              <a:t>Sur la carte, clic droit -&gt; Créer des entités de Point -&gt; Créer un point sur une position</a:t>
-            </a:r>
-          </a:p>
-          <a:p>
-            <a:pPr marL="0" lvl="0" indent="0">
-              <a:buFontTx/>
-              <a:buNone/>
-            </a:pPr>
+              <a:t>A environ 980m, 274° du centre de </a:t>
+            </a:r>
+            <a:r>
+              <a:rPr lang="fr-FR" baseline="0" dirty="0" err="1" smtClean="0"/>
+              <a:t>Printzheim</a:t>
+            </a:r>
             <a:endParaRPr lang="fr-FR" baseline="0" dirty="0" smtClean="0"/>
           </a:p>
           <a:p>
-            <a:pPr marL="171450" lvl="0" indent="-171450">
-              <a:buFontTx/>
-              <a:buChar char="-"/>
-            </a:pPr>
-            <a:r>
-              <a:rPr lang="fr-FR" baseline="0" dirty="0" smtClean="0"/>
-              <a:t>Pour tracer l’itinéraire :</a:t>
-            </a:r>
-          </a:p>
-          <a:p>
-            <a:pPr marL="171450" lvl="0" indent="-171450">
-              <a:buFontTx/>
-              <a:buChar char="-"/>
-            </a:pPr>
-            <a:r>
-              <a:rPr lang="fr-FR" baseline="0" dirty="0" smtClean="0"/>
-              <a:t>Utiliser l’outil de création de ligne (traits droits ou main levée)</a:t>
-            </a:r>
-          </a:p>
-          <a:p>
-            <a:pPr marL="171450" lvl="0" indent="-171450">
-              <a:buFontTx/>
-              <a:buChar char="-"/>
-            </a:pPr>
-            <a:r>
-              <a:rPr lang="fr-FR" baseline="0" dirty="0" smtClean="0"/>
-              <a:t>En passant par l’outil numériseur :</a:t>
-            </a:r>
-          </a:p>
-          <a:p>
-            <a:pPr marL="171450" lvl="0" indent="-171450">
-              <a:buFontTx/>
-              <a:buChar char="-"/>
-            </a:pPr>
-            <a:r>
-              <a:rPr lang="fr-FR" baseline="0" dirty="0" smtClean="0"/>
-              <a:t>Sur la carte, clic droit -&gt; Créer des entités de Lignes -&gt; Créer ligne ou Créer trace</a:t>
-            </a:r>
-          </a:p>
-          <a:p>
-            <a:pPr marL="171450" lvl="0" indent="-171450">
-              <a:buFontTx/>
-              <a:buChar char="-"/>
-            </a:pPr>
-            <a:r>
-              <a:rPr lang="fr-FR" b="1" baseline="0" dirty="0" smtClean="0"/>
-              <a:t>Enregistrer l’itinéraire dans une couche « itinéraire »</a:t>
-            </a:r>
-          </a:p>
-          <a:p>
-            <a:pPr marL="171450" lvl="0" indent="-171450">
+            <a:pPr marL="171450" indent="-171450">
               <a:buFontTx/>
               <a:buChar char="-"/>
             </a:pPr>
             <a:endParaRPr lang="fr-FR" baseline="0" dirty="0" smtClean="0"/>
           </a:p>
           <a:p>
-            <a:pPr marL="0" lvl="0" indent="0">
+            <a:pPr marL="0" indent="0">
               <a:buFontTx/>
               <a:buNone/>
             </a:pPr>
             <a:r>
               <a:rPr lang="fr-FR" baseline="0" dirty="0" smtClean="0"/>
-              <a:t>2) Ajouter des PPO</a:t>
-            </a:r>
-          </a:p>
-          <a:p>
-            <a:pPr marL="171450" lvl="0" indent="-171450">
+              <a:t>2) Créer un point</a:t>
+            </a:r>
+          </a:p>
+          <a:p>
+            <a:pPr marL="171450" indent="-171450">
               <a:buFontTx/>
               <a:buChar char="-"/>
             </a:pPr>
             <a:r>
               <a:rPr lang="fr-FR" baseline="0" dirty="0" smtClean="0"/>
-              <a:t>Utiliser l’outil création de point pour placer les points voulus</a:t>
-            </a:r>
-          </a:p>
-          <a:p>
-            <a:pPr marL="171450" lvl="0" indent="-171450">
+              <a:t>Utiliser l’outil Création ou de point</a:t>
+            </a:r>
+          </a:p>
+          <a:p>
+            <a:pPr marL="171450" indent="-171450">
               <a:buFontTx/>
               <a:buChar char="-"/>
             </a:pPr>
             <a:r>
               <a:rPr lang="fr-FR" baseline="0" dirty="0" smtClean="0"/>
-              <a:t>Enregistrer les points dans la couche itinéraire</a:t>
-            </a:r>
-          </a:p>
-          <a:p>
-            <a:pPr marL="171450" lvl="0" indent="-171450">
+              <a:t>Ou sélectionner l’outil numériseur</a:t>
+            </a:r>
+          </a:p>
+          <a:p>
+            <a:pPr marL="171450" indent="-171450">
               <a:buFontTx/>
               <a:buChar char="-"/>
             </a:pPr>
-            <a:endParaRPr lang="fr-FR" baseline="0" dirty="0" smtClean="0"/>
-          </a:p>
-          <a:p>
-            <a:pPr marL="0" lvl="0" indent="0">
-              <a:buFontTx/>
-              <a:buNone/>
-            </a:pPr>
             <a:r>
               <a:rPr lang="fr-FR" baseline="0" dirty="0" smtClean="0"/>
-              <a:t>3) Effectuer le profil du tracé</a:t>
-            </a:r>
-          </a:p>
-          <a:p>
-            <a:pPr marL="171450" lvl="0" indent="-171450">
+              <a:t>Sur la carte, clic droit -&gt; Créer une entité de point</a:t>
+            </a:r>
+          </a:p>
+          <a:p>
+            <a:pPr marL="171450" indent="-171450">
               <a:buFontTx/>
               <a:buChar char="-"/>
             </a:pPr>
             <a:r>
               <a:rPr lang="fr-FR" baseline="0" dirty="0" smtClean="0"/>
-              <a:t>Sélectionner l’outil numériseur</a:t>
-            </a:r>
-          </a:p>
-          <a:p>
-            <a:pPr marL="171450" lvl="0" indent="-171450">
+              <a:t>Sélectionner la couche « Créer une nouvelle couche »</a:t>
+            </a:r>
+          </a:p>
+          <a:p>
+            <a:pPr marL="0" indent="0">
+              <a:buFontTx/>
+              <a:buNone/>
+            </a:pPr>
+            <a:endParaRPr lang="fr-FR" baseline="0" dirty="0" smtClean="0"/>
+          </a:p>
+          <a:p>
+            <a:pPr marL="0" indent="0">
+              <a:buFontTx/>
+              <a:buNone/>
+            </a:pPr>
+            <a:r>
+              <a:rPr lang="fr-FR" baseline="0" dirty="0" smtClean="0"/>
+              <a:t>3) Localiser le croisement en T</a:t>
+            </a:r>
+          </a:p>
+          <a:p>
+            <a:pPr marL="171450" indent="-171450">
               <a:buFontTx/>
               <a:buChar char="-"/>
             </a:pPr>
             <a:r>
               <a:rPr lang="fr-FR" baseline="0" dirty="0" smtClean="0"/>
-              <a:t>Sélectionner l’itinéraire</a:t>
-            </a:r>
-          </a:p>
-          <a:p>
-            <a:pPr marL="171450" lvl="0" indent="-171450">
+              <a:t>Utiliser l’outil mesure ou le COGO</a:t>
+            </a:r>
+          </a:p>
+          <a:p>
+            <a:pPr marL="171450" indent="-171450">
               <a:buFontTx/>
               <a:buChar char="-"/>
             </a:pPr>
             <a:r>
               <a:rPr lang="fr-FR" baseline="0" dirty="0" smtClean="0"/>
-              <a:t>Clic droit -&gt; Analyses et mesures -&gt; Profil de tracé</a:t>
-            </a:r>
+              <a:t>Le croisement est en </a:t>
+            </a:r>
+            <a:r>
+              <a:rPr lang="pl-PL" baseline="0" dirty="0" smtClean="0"/>
+              <a:t>32 U LV 85091 04483</a:t>
+            </a:r>
+            <a:endParaRPr lang="fr-FR" baseline="0" dirty="0" smtClean="0"/>
+          </a:p>
+          <a:p>
+            <a:pPr marL="0" indent="0">
+              <a:buFontTx/>
+              <a:buNone/>
+            </a:pPr>
+            <a:endParaRPr lang="fr-FR" baseline="0" dirty="0" smtClean="0"/>
+          </a:p>
+          <a:p>
+            <a:pPr marL="0" indent="0">
+              <a:buFontTx/>
+              <a:buNone/>
+            </a:pPr>
+            <a:r>
+              <a:rPr lang="fr-FR" baseline="0" dirty="0" smtClean="0"/>
+              <a:t>4) Dessiner une ellipse</a:t>
+            </a:r>
+          </a:p>
+          <a:p>
+            <a:pPr marL="171450" indent="-171450">
+              <a:buFontTx/>
+              <a:buChar char="-"/>
+            </a:pPr>
+            <a:r>
+              <a:rPr lang="fr-FR" baseline="0" dirty="0" smtClean="0"/>
+              <a:t>Utiliser l’outil de création de cercle / ellipse</a:t>
+            </a:r>
+          </a:p>
+          <a:p>
+            <a:pPr marL="171450" indent="-171450">
+              <a:buFontTx/>
+              <a:buChar char="-"/>
+            </a:pPr>
+            <a:r>
+              <a:rPr lang="fr-FR" baseline="0" dirty="0" smtClean="0"/>
+              <a:t>Ou passer par l’outil numériseur</a:t>
+            </a:r>
+          </a:p>
+          <a:p>
+            <a:pPr marL="171450" marR="0" indent="-171450" algn="l" defTabSz="914400" rtl="0" eaLnBrk="1" fontAlgn="auto" latinLnBrk="0" hangingPunct="1">
+              <a:lnSpc>
+                <a:spcPct val="100000"/>
+              </a:lnSpc>
+              <a:spcBef>
+                <a:spcPts val="0"/>
+              </a:spcBef>
+              <a:spcAft>
+                <a:spcPts val="0"/>
+              </a:spcAft>
+              <a:buClrTx/>
+              <a:buSzTx/>
+              <a:buFontTx/>
+              <a:buChar char="-"/>
+              <a:tabLst/>
+              <a:defRPr/>
+            </a:pPr>
+            <a:r>
+              <a:rPr lang="fr-FR" baseline="0" dirty="0" smtClean="0"/>
+              <a:t>Sur la carte, clic droit -&gt; Créer une entité de surface -&gt; Créer une surface circulaire</a:t>
+            </a:r>
+          </a:p>
+          <a:p>
+            <a:pPr marL="171450" indent="-171450">
+              <a:buFontTx/>
+              <a:buChar char="-"/>
+            </a:pPr>
+            <a:endParaRPr lang="fr-FR" dirty="0"/>
           </a:p>
         </p:txBody>
       </p:sp>
@@ -2052,7 +1887,7 @@
           <a:p>
             <a:fld id="{7FED9F59-E5F7-4D0D-AFB1-35ABD0360038}" type="slidenum">
               <a:rPr lang="fr-FR" smtClean="0"/>
-              <a:t>12</a:t>
+              <a:t>11</a:t>
             </a:fld>
             <a:endParaRPr lang="fr-FR"/>
           </a:p>
@@ -2061,7 +1896,7 @@
     </p:spTree>
     <p:extLst>
       <p:ext uri="{BB962C8B-B14F-4D97-AF65-F5344CB8AC3E}">
-        <p14:creationId xmlns:p14="http://schemas.microsoft.com/office/powerpoint/2010/main" val="302964402"/>
+        <p14:creationId xmlns:p14="http://schemas.microsoft.com/office/powerpoint/2010/main" val="4184430103"/>
       </p:ext>
     </p:extLst>
   </p:cSld>
@@ -2098,7 +1933,12 @@
             <p:ph type="sldImg"/>
           </p:nvPr>
         </p:nvSpPr>
-        <p:spPr/>
+        <p:spPr>
+          <a:xfrm>
+            <a:off x="685800" y="1143000"/>
+            <a:ext cx="5486400" cy="3086100"/>
+          </a:xfrm>
+        </p:spPr>
       </p:sp>
       <p:sp>
         <p:nvSpPr>
@@ -2115,27 +1955,88 @@
           <a:bodyPr/>
           <a:lstStyle/>
           <a:p>
-            <a:pPr marL="228600" indent="-228600">
-              <a:buAutoNum type="arabicParenR"/>
+            <a:pPr marL="0" indent="0">
+              <a:buNone/>
             </a:pPr>
             <a:r>
+              <a:rPr lang="fr-FR" dirty="0" smtClean="0"/>
+              <a:t>1) Importer le symbole VAB</a:t>
+            </a:r>
+            <a:endParaRPr lang="fr-FR" baseline="0" dirty="0" smtClean="0"/>
+          </a:p>
+          <a:p>
+            <a:pPr marL="171450" indent="-171450">
+              <a:buFontTx/>
+              <a:buChar char="-"/>
+            </a:pPr>
+            <a:r>
               <a:rPr lang="fr-FR" baseline="0" dirty="0" smtClean="0"/>
-              <a:t>Importer le vecteur</a:t>
-            </a:r>
-          </a:p>
-          <a:p>
-            <a:pPr marL="228600" indent="-228600">
-              <a:buAutoNum type="arabicParenR"/>
+              <a:t>Menu Outil -&gt; Configurer</a:t>
+            </a:r>
+          </a:p>
+          <a:p>
+            <a:pPr marL="171450" indent="-171450">
+              <a:buFontTx/>
+              <a:buChar char="-"/>
+            </a:pPr>
+            <a:r>
+              <a:rPr lang="fr-FR" baseline="0" dirty="0" smtClean="0"/>
+              <a:t>Onglet « Style de point », sous menu « Symboles personnalisés »</a:t>
+            </a:r>
+          </a:p>
+          <a:p>
+            <a:pPr marL="171450" indent="-171450">
+              <a:buFontTx/>
+              <a:buChar char="-"/>
+            </a:pPr>
+            <a:r>
+              <a:rPr lang="fr-FR" baseline="0" dirty="0" smtClean="0"/>
+              <a:t>Ajouter un symbole</a:t>
+            </a:r>
+          </a:p>
+          <a:p>
+            <a:pPr marL="171450" indent="-171450">
+              <a:buFontTx/>
+              <a:buChar char="-"/>
+            </a:pPr>
+            <a:r>
+              <a:rPr lang="fr-FR" baseline="0" dirty="0" smtClean="0"/>
+              <a:t>Sélectionner l’image CARTO/import/VAB.jpg</a:t>
+            </a:r>
+          </a:p>
+          <a:p>
+            <a:pPr marL="171450" indent="-171450">
+              <a:buFontTx/>
+              <a:buChar char="-"/>
+            </a:pPr>
+            <a:r>
+              <a:rPr lang="fr-FR" baseline="0" dirty="0" smtClean="0"/>
+              <a:t>Nommer le symbole VAB, valider</a:t>
+            </a:r>
+          </a:p>
+          <a:p>
+            <a:pPr marL="0" indent="0">
+              <a:buFontTx/>
+              <a:buNone/>
             </a:pPr>
             <a:endParaRPr lang="fr-FR" baseline="0" dirty="0" smtClean="0"/>
           </a:p>
           <a:p>
-            <a:pPr marL="228600" indent="-228600">
-              <a:buAutoNum type="arabicParenR"/>
+            <a:pPr marL="0" indent="0">
+              <a:buFontTx/>
+              <a:buNone/>
             </a:pPr>
             <a:r>
               <a:rPr lang="fr-FR" baseline="0" dirty="0" smtClean="0"/>
-              <a:t>Trouver le point le plus haut</a:t>
+              <a:t>2) </a:t>
+            </a:r>
+            <a:r>
+              <a:rPr lang="fr-FR" dirty="0" smtClean="0"/>
+              <a:t>Créer le style</a:t>
+            </a:r>
+            <a:r>
+              <a:rPr lang="fr-FR" baseline="0" dirty="0" smtClean="0"/>
+              <a:t> de point SAEB</a:t>
             </a:r>
           </a:p>
           <a:p>
@@ -2158,7 +2059,7 @@
             </a:pPr>
             <a:r>
               <a:rPr lang="fr-FR" baseline="0" dirty="0" smtClean="0"/>
-              <a:t>Avec le numériseur, sélectionner la zone dans laquelle chercher</a:t>
+              <a:t>Onglet « Style de point », sous menu « style de point »</a:t>
             </a:r>
           </a:p>
           <a:p>
@@ -2181,47 +2082,7 @@
             </a:pPr>
             <a:r>
               <a:rPr lang="fr-FR" baseline="0" dirty="0" smtClean="0"/>
-              <a:t>Clic droit -&gt; </a:t>
-            </a:r>
-            <a:r>
-              <a:rPr lang="fr-FR" baseline="0" dirty="0" err="1" smtClean="0"/>
-              <a:t>Analysis</a:t>
-            </a:r>
-            <a:r>
-              <a:rPr lang="fr-FR" baseline="0" dirty="0" smtClean="0"/>
-              <a:t>/</a:t>
-            </a:r>
-            <a:r>
-              <a:rPr lang="fr-FR" baseline="0" dirty="0" err="1" smtClean="0"/>
-              <a:t>measurements</a:t>
-            </a:r>
-            <a:r>
-              <a:rPr lang="fr-FR" baseline="0" dirty="0" smtClean="0"/>
-              <a:t> -&gt; </a:t>
-            </a:r>
-            <a:r>
-              <a:rPr lang="fr-FR" baseline="0" dirty="0" err="1" smtClean="0"/>
-              <a:t>Calculate</a:t>
-            </a:r>
-            <a:r>
-              <a:rPr lang="fr-FR" baseline="0" dirty="0" smtClean="0"/>
-              <a:t> </a:t>
-            </a:r>
-            <a:r>
-              <a:rPr lang="fr-FR" baseline="0" dirty="0" err="1" smtClean="0"/>
-              <a:t>Elevation</a:t>
-            </a:r>
-            <a:r>
-              <a:rPr lang="fr-FR" baseline="0" dirty="0" smtClean="0"/>
-              <a:t>/</a:t>
-            </a:r>
-            <a:r>
-              <a:rPr lang="fr-FR" baseline="0" dirty="0" err="1" smtClean="0"/>
-              <a:t>slope</a:t>
-            </a:r>
-            <a:r>
-              <a:rPr lang="fr-FR" baseline="0" dirty="0" smtClean="0"/>
-              <a:t>…</a:t>
+              <a:t>Créer un nouveau type</a:t>
             </a:r>
           </a:p>
           <a:p>
@@ -2244,101 +2105,430 @@
             </a:pPr>
             <a:r>
               <a:rPr lang="fr-FR" baseline="0" dirty="0" smtClean="0"/>
-              <a:t>Les points les plus haut et bas sont ajoutés</a:t>
-            </a:r>
-          </a:p>
-          <a:p>
-            <a:pPr marL="0" indent="0">
-              <a:buNone/>
+              <a:t>Nommer le type SAEB, choisir le symbole VAB</a:t>
+            </a:r>
+          </a:p>
+          <a:p>
+            <a:pPr marL="171450" marR="0" indent="-171450" algn="l" defTabSz="914400" rtl="0" eaLnBrk="1" fontAlgn="auto" latinLnBrk="0" hangingPunct="1">
+              <a:lnSpc>
+                <a:spcPct val="100000"/>
+              </a:lnSpc>
+              <a:spcBef>
+                <a:spcPts val="0"/>
+              </a:spcBef>
+              <a:spcAft>
+                <a:spcPts val="0"/>
+              </a:spcAft>
+              <a:buClrTx/>
+              <a:buSzTx/>
+              <a:buFontTx/>
+              <a:buChar char="-"/>
+              <a:tabLst/>
+              <a:defRPr/>
             </a:pPr>
             <a:endParaRPr lang="fr-FR" baseline="0" dirty="0" smtClean="0"/>
           </a:p>
           <a:p>
-            <a:pPr marL="0" indent="0">
-              <a:buNone/>
+            <a:pPr marL="0" marR="0" indent="0" algn="l" defTabSz="914400" rtl="0" eaLnBrk="1" fontAlgn="auto" latinLnBrk="0" hangingPunct="1">
+              <a:lnSpc>
+                <a:spcPct val="100000"/>
+              </a:lnSpc>
+              <a:spcBef>
+                <a:spcPts val="0"/>
+              </a:spcBef>
+              <a:spcAft>
+                <a:spcPts val="0"/>
+              </a:spcAft>
+              <a:buClrTx/>
+              <a:buSzTx/>
+              <a:buFontTx/>
+              <a:buNone/>
+              <a:tabLst/>
+              <a:defRPr/>
             </a:pPr>
             <a:r>
               <a:rPr lang="fr-FR" baseline="0" dirty="0" smtClean="0"/>
-              <a:t>3) </a:t>
-            </a:r>
-            <a:r>
-              <a:rPr lang="fr-FR" baseline="0" dirty="0" err="1" smtClean="0"/>
-              <a:t>Intervisiblité</a:t>
-            </a:r>
-            <a:endParaRPr lang="fr-FR" dirty="0" smtClean="0"/>
-          </a:p>
-          <a:p>
-            <a:pPr marL="171450" indent="-171450">
+              <a:t>3) Définir le style de point SAEB</a:t>
+            </a:r>
+          </a:p>
+          <a:p>
+            <a:pPr marL="171450" marR="0" indent="-171450" algn="l" defTabSz="914400" rtl="0" eaLnBrk="1" fontAlgn="auto" latinLnBrk="0" hangingPunct="1">
+              <a:lnSpc>
+                <a:spcPct val="100000"/>
+              </a:lnSpc>
+              <a:spcBef>
+                <a:spcPts val="0"/>
+              </a:spcBef>
+              <a:spcAft>
+                <a:spcPts val="0"/>
+              </a:spcAft>
+              <a:buClrTx/>
+              <a:buSzTx/>
+              <a:buFontTx/>
+              <a:buChar char="-"/>
+              <a:tabLst/>
+              <a:defRPr/>
+            </a:pPr>
+            <a:r>
+              <a:rPr lang="fr-FR" baseline="0" dirty="0" smtClean="0"/>
+              <a:t>Sélectionner l’outil numériseur</a:t>
+            </a:r>
+          </a:p>
+          <a:p>
+            <a:pPr marL="171450" marR="0" indent="-171450" algn="l" defTabSz="914400" rtl="0" eaLnBrk="1" fontAlgn="auto" latinLnBrk="0" hangingPunct="1">
+              <a:lnSpc>
+                <a:spcPct val="100000"/>
+              </a:lnSpc>
+              <a:spcBef>
+                <a:spcPts val="0"/>
+              </a:spcBef>
+              <a:spcAft>
+                <a:spcPts val="0"/>
+              </a:spcAft>
+              <a:buClrTx/>
+              <a:buSzTx/>
+              <a:buFontTx/>
+              <a:buChar char="-"/>
+              <a:tabLst/>
+              <a:defRPr/>
+            </a:pPr>
+            <a:r>
+              <a:rPr lang="fr-FR" baseline="0" dirty="0" smtClean="0"/>
+              <a:t>Sélectionner le point SAEB</a:t>
+            </a:r>
+          </a:p>
+          <a:p>
+            <a:pPr marL="171450" marR="0" indent="-171450" algn="l" defTabSz="914400" rtl="0" eaLnBrk="1" fontAlgn="auto" latinLnBrk="0" hangingPunct="1">
+              <a:lnSpc>
+                <a:spcPct val="100000"/>
+              </a:lnSpc>
+              <a:spcBef>
+                <a:spcPts val="0"/>
+              </a:spcBef>
+              <a:spcAft>
+                <a:spcPts val="0"/>
+              </a:spcAft>
+              <a:buClrTx/>
+              <a:buSzTx/>
+              <a:buFontTx/>
+              <a:buChar char="-"/>
+              <a:tabLst/>
+              <a:defRPr/>
+            </a:pPr>
+            <a:r>
+              <a:rPr lang="fr-FR" baseline="0" dirty="0" smtClean="0"/>
+              <a:t>Clic droit -&gt; Modifier l’entité</a:t>
+            </a:r>
+          </a:p>
+          <a:p>
+            <a:pPr marL="171450" marR="0" indent="-171450" algn="l" defTabSz="914400" rtl="0" eaLnBrk="1" fontAlgn="auto" latinLnBrk="0" hangingPunct="1">
+              <a:lnSpc>
+                <a:spcPct val="100000"/>
+              </a:lnSpc>
+              <a:spcBef>
+                <a:spcPts val="0"/>
+              </a:spcBef>
+              <a:spcAft>
+                <a:spcPts val="0"/>
+              </a:spcAft>
+              <a:buClrTx/>
+              <a:buSzTx/>
+              <a:buFontTx/>
+              <a:buChar char="-"/>
+              <a:tabLst/>
+              <a:defRPr/>
+            </a:pPr>
+            <a:r>
+              <a:rPr lang="fr-FR" baseline="0" dirty="0" smtClean="0"/>
+              <a:t>Définir le « type d’entité » sur SAEB</a:t>
+            </a:r>
+          </a:p>
+          <a:p>
+            <a:pPr marL="0" marR="0" indent="0" algn="l" defTabSz="914400" rtl="0" eaLnBrk="1" fontAlgn="auto" latinLnBrk="0" hangingPunct="1">
+              <a:lnSpc>
+                <a:spcPct val="100000"/>
+              </a:lnSpc>
+              <a:spcBef>
+                <a:spcPts val="0"/>
+              </a:spcBef>
+              <a:spcAft>
+                <a:spcPts val="0"/>
+              </a:spcAft>
+              <a:buClrTx/>
+              <a:buSzTx/>
+              <a:buFontTx/>
+              <a:buNone/>
+              <a:tabLst/>
+              <a:defRPr/>
+            </a:pPr>
+            <a:endParaRPr lang="fr-FR" dirty="0"/>
+          </a:p>
+        </p:txBody>
+      </p:sp>
+      <p:sp>
+        <p:nvSpPr>
+          <p:cNvPr id="4" name="Espace réservé du numéro de diapositive 3"/>
+          <p:cNvSpPr>
+            <a:spLocks noGrp="1"/>
+          </p:cNvSpPr>
+          <p:nvPr>
+            <p:ph type="sldNum" sz="quarter" idx="10"/>
+          </p:nvPr>
+        </p:nvSpPr>
+        <p:spPr/>
+        <p:txBody>
+          <a:bodyPr/>
+          <a:lstStyle/>
+          <a:p>
+            <a:fld id="{7FED9F59-E5F7-4D0D-AFB1-35ABD0360038}" type="slidenum">
+              <a:rPr lang="fr-FR" smtClean="0"/>
+              <a:t>12</a:t>
+            </a:fld>
+            <a:endParaRPr lang="fr-FR"/>
+          </a:p>
+        </p:txBody>
+      </p:sp>
+    </p:spTree>
+    <p:extLst>
+      <p:ext uri="{BB962C8B-B14F-4D97-AF65-F5344CB8AC3E}">
+        <p14:creationId xmlns:p14="http://schemas.microsoft.com/office/powerpoint/2010/main" val="2997087999"/>
+      </p:ext>
+    </p:extLst>
+  </p:cSld>
+  <p:clrMapOvr>
+    <a:masterClrMapping/>
+  </p:clrMapOvr>
+</p:notes>
+</file>
+
+<file path=ppt/notesSlides/notesSlide9.xml><?xml version="1.0" encoding="utf-8"?>
+<p:notes xmlns:a="http://schemas.openxmlformats.org/drawingml/2006/main" xmlns:r="http://schemas.openxmlformats.org/officeDocument/2006/relationships" xmlns:p="http://schemas.openxmlformats.org/presentationml/2006/main">
+  <p:cSld>
+    <p:spTree>
+      <p:nvGrpSpPr>
+        <p:cNvPr id="1" name=""/>
+        <p:cNvGrpSpPr/>
+        <p:nvPr/>
+      </p:nvGrpSpPr>
+      <p:grpSpPr>
+        <a:xfrm>
+          <a:off x="0" y="0"/>
+          <a:ext cx="0" cy="0"/>
+          <a:chOff x="0" y="0"/>
+          <a:chExt cx="0" cy="0"/>
+        </a:xfrm>
+      </p:grpSpPr>
+      <p:sp>
+        <p:nvSpPr>
+          <p:cNvPr id="2" name="Espace réservé de l'image des diapositives 1"/>
+          <p:cNvSpPr>
+            <a:spLocks noGrp="1" noRot="1" noChangeAspect="1"/>
+          </p:cNvSpPr>
+          <p:nvPr>
+            <p:ph type="sldImg"/>
+          </p:nvPr>
+        </p:nvSpPr>
+        <p:spPr>
+          <a:xfrm>
+            <a:off x="685800" y="1143000"/>
+            <a:ext cx="5486400" cy="3086100"/>
+          </a:xfrm>
+        </p:spPr>
+      </p:sp>
+      <p:sp>
+        <p:nvSpPr>
+          <p:cNvPr id="3" name="Espace réservé des commentaires 2"/>
+          <p:cNvSpPr>
+            <a:spLocks noGrp="1"/>
+          </p:cNvSpPr>
+          <p:nvPr>
+            <p:ph type="body" idx="1"/>
+          </p:nvPr>
+        </p:nvSpPr>
+        <p:spPr/>
+        <p:txBody>
+          <a:bodyPr/>
+          <a:lstStyle/>
+          <a:p>
+            <a:pPr marL="228600" indent="-228600">
+              <a:buFontTx/>
+              <a:buAutoNum type="arabicParenR"/>
+            </a:pPr>
+            <a:r>
+              <a:rPr lang="fr-FR" baseline="0" dirty="0" smtClean="0"/>
+              <a:t>Tracer un itinéraire</a:t>
+            </a:r>
+          </a:p>
+          <a:p>
+            <a:pPr marL="171450" lvl="0" indent="-171450">
               <a:buFontTx/>
               <a:buChar char="-"/>
             </a:pPr>
             <a:r>
-              <a:rPr lang="fr-FR" dirty="0" smtClean="0"/>
-              <a:t>Sélectionner</a:t>
-            </a:r>
-            <a:r>
               <a:rPr lang="fr-FR" baseline="0" dirty="0" smtClean="0"/>
-              <a:t> le point avec le numériseur</a:t>
-            </a:r>
-          </a:p>
-          <a:p>
-            <a:pPr marL="171450" indent="-171450">
+              <a:t>Placer un point sur le départ et l’arrivée :</a:t>
+            </a:r>
+          </a:p>
+          <a:p>
+            <a:pPr marL="171450" lvl="0" indent="-171450">
               <a:buFontTx/>
               <a:buChar char="-"/>
             </a:pPr>
             <a:r>
               <a:rPr lang="fr-FR" baseline="0" dirty="0" smtClean="0"/>
-              <a:t>Clic droit -&gt; </a:t>
-            </a:r>
-            <a:r>
-              <a:rPr lang="fr-FR" baseline="0" dirty="0" err="1" smtClean="0"/>
-              <a:t>Analysis</a:t>
-            </a:r>
-            <a:r>
-              <a:rPr lang="fr-FR" baseline="0" dirty="0" smtClean="0"/>
-              <a:t>/</a:t>
-            </a:r>
-            <a:r>
-              <a:rPr lang="fr-FR" baseline="0" dirty="0" err="1" smtClean="0"/>
-              <a:t>measurement</a:t>
-            </a:r>
-            <a:r>
-              <a:rPr lang="fr-FR" baseline="0" dirty="0" smtClean="0"/>
-              <a:t> -&gt; </a:t>
-            </a:r>
-            <a:r>
-              <a:rPr lang="fr-FR" baseline="0" dirty="0" err="1" smtClean="0"/>
-              <a:t>calculate</a:t>
-            </a:r>
-            <a:r>
-              <a:rPr lang="fr-FR" baseline="0" dirty="0" smtClean="0"/>
-              <a:t> </a:t>
-            </a:r>
-            <a:r>
-              <a:rPr lang="fr-FR" baseline="0" dirty="0" err="1" smtClean="0"/>
-              <a:t>view</a:t>
-            </a:r>
-            <a:r>
-              <a:rPr lang="fr-FR" baseline="0" smtClean="0"/>
-              <a:t> shed</a:t>
-            </a:r>
-          </a:p>
-          <a:p>
-            <a:pPr marL="171450" indent="-171450">
+              <a:t>Activer l’outil numériseur</a:t>
+            </a:r>
+          </a:p>
+          <a:p>
+            <a:pPr marL="171450" lvl="0" indent="-171450">
               <a:buFontTx/>
               <a:buChar char="-"/>
             </a:pPr>
             <a:r>
-              <a:rPr lang="fr-FR" baseline="0" smtClean="0"/>
-              <a:t>Distance </a:t>
-            </a:r>
-            <a:r>
               <a:rPr lang="fr-FR" baseline="0" dirty="0" smtClean="0"/>
-              <a:t>de 3km</a:t>
-            </a:r>
-          </a:p>
-          <a:p>
-            <a:endParaRPr lang="fr-FR" dirty="0"/>
+              <a:t>Sur la carte, clic droit -&gt; Créer des entités de Point -&gt; Créer un point sur une position</a:t>
+            </a:r>
+          </a:p>
+          <a:p>
+            <a:pPr marL="0" lvl="0" indent="0">
+              <a:buFontTx/>
+              <a:buNone/>
+            </a:pPr>
+            <a:endParaRPr lang="fr-FR" baseline="0" dirty="0" smtClean="0"/>
+          </a:p>
+          <a:p>
+            <a:pPr marL="171450" lvl="0" indent="-171450">
+              <a:buFontTx/>
+              <a:buChar char="-"/>
+            </a:pPr>
+            <a:r>
+              <a:rPr lang="fr-FR" baseline="0" dirty="0" smtClean="0"/>
+              <a:t>Pour tracer l’itinéraire :</a:t>
+            </a:r>
+          </a:p>
+          <a:p>
+            <a:pPr marL="171450" lvl="0" indent="-171450">
+              <a:buFontTx/>
+              <a:buChar char="-"/>
+            </a:pPr>
+            <a:r>
+              <a:rPr lang="fr-FR" baseline="0" dirty="0" smtClean="0"/>
+              <a:t>Utiliser l’outil de création de ligne (traits droits ou main levée)</a:t>
+            </a:r>
+          </a:p>
+          <a:p>
+            <a:pPr marL="171450" lvl="0" indent="-171450">
+              <a:buFontTx/>
+              <a:buChar char="-"/>
+            </a:pPr>
+            <a:r>
+              <a:rPr lang="fr-FR" baseline="0" dirty="0" smtClean="0"/>
+              <a:t>En passant par l’outil numériseur :</a:t>
+            </a:r>
+          </a:p>
+          <a:p>
+            <a:pPr marL="171450" lvl="0" indent="-171450">
+              <a:buFontTx/>
+              <a:buChar char="-"/>
+            </a:pPr>
+            <a:r>
+              <a:rPr lang="fr-FR" baseline="0" dirty="0" smtClean="0"/>
+              <a:t>Sur la carte, clic droit -&gt; Créer des entités de Lignes -&gt; Créer ligne ou Créer trace</a:t>
+            </a:r>
+          </a:p>
+          <a:p>
+            <a:pPr marL="171450" lvl="0" indent="-171450">
+              <a:buFontTx/>
+              <a:buChar char="-"/>
+            </a:pPr>
+            <a:r>
+              <a:rPr lang="fr-FR" b="1" baseline="0" dirty="0" smtClean="0"/>
+              <a:t>Enregistrer l’itinéraire dans une couche « itinéraire »</a:t>
+            </a:r>
+          </a:p>
+          <a:p>
+            <a:pPr marL="171450" lvl="0" indent="-171450">
+              <a:buFontTx/>
+              <a:buChar char="-"/>
+            </a:pPr>
+            <a:endParaRPr lang="fr-FR" baseline="0" dirty="0" smtClean="0"/>
+          </a:p>
+          <a:p>
+            <a:pPr marL="0" lvl="0" indent="0">
+              <a:buFontTx/>
+              <a:buNone/>
+            </a:pPr>
+            <a:r>
+              <a:rPr lang="fr-FR" baseline="0" dirty="0" smtClean="0"/>
+              <a:t>2) Ajouter des PPO</a:t>
+            </a:r>
+          </a:p>
+          <a:p>
+            <a:pPr marL="171450" lvl="0" indent="-171450">
+              <a:buFontTx/>
+              <a:buChar char="-"/>
+            </a:pPr>
+            <a:r>
+              <a:rPr lang="fr-FR" baseline="0" dirty="0" smtClean="0"/>
+              <a:t>Utiliser l’outil création de point pour placer les points voulus</a:t>
+            </a:r>
+          </a:p>
+          <a:p>
+            <a:pPr marL="171450" lvl="0" indent="-171450">
+              <a:buFontTx/>
+              <a:buChar char="-"/>
+            </a:pPr>
+            <a:r>
+              <a:rPr lang="fr-FR" baseline="0" dirty="0" smtClean="0"/>
+              <a:t>Enregistrer les points dans la couche itinéraire</a:t>
+            </a:r>
+          </a:p>
+          <a:p>
+            <a:pPr marL="171450" lvl="0" indent="-171450">
+              <a:buFontTx/>
+              <a:buChar char="-"/>
+            </a:pPr>
+            <a:endParaRPr lang="fr-FR" baseline="0" dirty="0" smtClean="0"/>
+          </a:p>
+          <a:p>
+            <a:pPr marL="0" lvl="0" indent="0">
+              <a:buFontTx/>
+              <a:buNone/>
+            </a:pPr>
+            <a:r>
+              <a:rPr lang="fr-FR" baseline="0" dirty="0" smtClean="0"/>
+              <a:t>3) Effectuer le profil du tracé</a:t>
+            </a:r>
+          </a:p>
+          <a:p>
+            <a:pPr marL="171450" lvl="0" indent="-171450">
+              <a:buFontTx/>
+              <a:buChar char="-"/>
+            </a:pPr>
+            <a:r>
+              <a:rPr lang="fr-FR" baseline="0" dirty="0" smtClean="0"/>
+              <a:t>Sélectionner l’outil numériseur</a:t>
+            </a:r>
+          </a:p>
+          <a:p>
+            <a:pPr marL="171450" lvl="0" indent="-171450">
+              <a:buFontTx/>
+              <a:buChar char="-"/>
+            </a:pPr>
+            <a:r>
+              <a:rPr lang="fr-FR" baseline="0" dirty="0" smtClean="0"/>
+              <a:t>Sélectionner l’itinéraire</a:t>
+            </a:r>
+          </a:p>
+          <a:p>
+            <a:pPr marL="171450" lvl="0" indent="-171450">
+              <a:buFontTx/>
+              <a:buChar char="-"/>
+            </a:pPr>
+            <a:r>
+              <a:rPr lang="fr-FR" baseline="0" dirty="0" smtClean="0"/>
+              <a:t>Clic droit -&gt; Analyses et mesures -&gt; Profil de tracé</a:t>
+            </a:r>
           </a:p>
         </p:txBody>
       </p:sp>
@@ -2359,7 +2549,7 @@
           <a:p>
             <a:fld id="{7FED9F59-E5F7-4D0D-AFB1-35ABD0360038}" type="slidenum">
               <a:rPr lang="fr-FR" smtClean="0"/>
-              <a:t>14</a:t>
+              <a:t>16</a:t>
             </a:fld>
             <a:endParaRPr lang="fr-FR"/>
           </a:p>
@@ -2368,7 +2558,7 @@
     </p:spTree>
     <p:extLst>
       <p:ext uri="{BB962C8B-B14F-4D97-AF65-F5344CB8AC3E}">
-        <p14:creationId xmlns:p14="http://schemas.microsoft.com/office/powerpoint/2010/main" val="3722148337"/>
+        <p14:creationId xmlns:p14="http://schemas.microsoft.com/office/powerpoint/2010/main" val="302964402"/>
       </p:ext>
     </p:extLst>
   </p:cSld>
@@ -2515,7 +2705,7 @@
           <a:p>
             <a:fld id="{A74F3EA5-292C-4331-BAB5-A6575F471254}" type="datetimeFigureOut">
               <a:rPr lang="fr-FR" smtClean="0"/>
-              <a:t>15/11/2022</a:t>
+              <a:t>06/01/2023</a:t>
             </a:fld>
             <a:endParaRPr lang="fr-FR"/>
           </a:p>
@@ -2701,7 +2891,7 @@
           <a:p>
             <a:fld id="{A74F3EA5-292C-4331-BAB5-A6575F471254}" type="datetimeFigureOut">
               <a:rPr lang="fr-FR" smtClean="0"/>
-              <a:t>15/11/2022</a:t>
+              <a:t>06/01/2023</a:t>
             </a:fld>
             <a:endParaRPr lang="fr-FR"/>
           </a:p>
@@ -2887,7 +3077,7 @@
           <a:p>
             <a:fld id="{A74F3EA5-292C-4331-BAB5-A6575F471254}" type="datetimeFigureOut">
               <a:rPr lang="fr-FR" smtClean="0"/>
-              <a:t>15/11/2022</a:t>
+              <a:t>06/01/2023</a:t>
             </a:fld>
             <a:endParaRPr lang="fr-FR"/>
           </a:p>
@@ -3079,7 +3269,7 @@
           <a:p>
             <a:fld id="{A74F3EA5-292C-4331-BAB5-A6575F471254}" type="datetimeFigureOut">
               <a:rPr lang="fr-FR" smtClean="0"/>
-              <a:t>15/11/2022</a:t>
+              <a:t>06/01/2023</a:t>
             </a:fld>
             <a:endParaRPr lang="fr-FR"/>
           </a:p>
@@ -3249,7 +3439,7 @@
           <a:p>
             <a:fld id="{A74F3EA5-292C-4331-BAB5-A6575F471254}" type="datetimeFigureOut">
               <a:rPr lang="fr-FR" smtClean="0"/>
-              <a:t>15/11/2022</a:t>
+              <a:t>06/01/2023</a:t>
             </a:fld>
             <a:endParaRPr lang="fr-FR"/>
           </a:p>
@@ -3495,7 +3685,7 @@
           <a:p>
             <a:fld id="{A74F3EA5-292C-4331-BAB5-A6575F471254}" type="datetimeFigureOut">
               <a:rPr lang="fr-FR" smtClean="0"/>
-              <a:t>15/11/2022</a:t>
+              <a:t>06/01/2023</a:t>
             </a:fld>
             <a:endParaRPr lang="fr-FR"/>
           </a:p>
@@ -3727,7 +3917,7 @@
           <a:p>
             <a:fld id="{A74F3EA5-292C-4331-BAB5-A6575F471254}" type="datetimeFigureOut">
               <a:rPr lang="fr-FR" smtClean="0"/>
-              <a:t>15/11/2022</a:t>
+              <a:t>06/01/2023</a:t>
             </a:fld>
             <a:endParaRPr lang="fr-FR"/>
           </a:p>
@@ -4094,7 +4284,7 @@
           <a:p>
             <a:fld id="{A74F3EA5-292C-4331-BAB5-A6575F471254}" type="datetimeFigureOut">
               <a:rPr lang="fr-FR" smtClean="0"/>
-              <a:t>15/11/2022</a:t>
+              <a:t>06/01/2023</a:t>
             </a:fld>
             <a:endParaRPr lang="fr-FR"/>
           </a:p>
@@ -4212,7 +4402,7 @@
           <a:p>
             <a:fld id="{A74F3EA5-292C-4331-BAB5-A6575F471254}" type="datetimeFigureOut">
               <a:rPr lang="fr-FR" smtClean="0"/>
-              <a:t>15/11/2022</a:t>
+              <a:t>06/01/2023</a:t>
             </a:fld>
             <a:endParaRPr lang="fr-FR"/>
           </a:p>
@@ -4307,7 +4497,7 @@
           <a:p>
             <a:fld id="{A74F3EA5-292C-4331-BAB5-A6575F471254}" type="datetimeFigureOut">
               <a:rPr lang="fr-FR" smtClean="0"/>
-              <a:t>15/11/2022</a:t>
+              <a:t>06/01/2023</a:t>
             </a:fld>
             <a:endParaRPr lang="fr-FR"/>
           </a:p>
@@ -4584,7 +4774,7 @@
           <a:p>
             <a:fld id="{A74F3EA5-292C-4331-BAB5-A6575F471254}" type="datetimeFigureOut">
               <a:rPr lang="fr-FR" smtClean="0"/>
-              <a:t>15/11/2022</a:t>
+              <a:t>06/01/2023</a:t>
             </a:fld>
             <a:endParaRPr lang="fr-FR"/>
           </a:p>
@@ -4770,7 +4960,7 @@
           <a:p>
             <a:fld id="{A74F3EA5-292C-4331-BAB5-A6575F471254}" type="datetimeFigureOut">
               <a:rPr lang="fr-FR" smtClean="0"/>
-              <a:t>15/11/2022</a:t>
+              <a:t>06/01/2023</a:t>
             </a:fld>
             <a:endParaRPr lang="fr-FR"/>
           </a:p>
@@ -5027,7 +5217,7 @@
           <a:p>
             <a:fld id="{A74F3EA5-292C-4331-BAB5-A6575F471254}" type="datetimeFigureOut">
               <a:rPr lang="fr-FR" smtClean="0"/>
-              <a:t>15/11/2022</a:t>
+              <a:t>06/01/2023</a:t>
             </a:fld>
             <a:endParaRPr lang="fr-FR"/>
           </a:p>
@@ -5197,7 +5387,7 @@
           <a:p>
             <a:fld id="{A74F3EA5-292C-4331-BAB5-A6575F471254}" type="datetimeFigureOut">
               <a:rPr lang="fr-FR" smtClean="0"/>
-              <a:t>15/11/2022</a:t>
+              <a:t>06/01/2023</a:t>
             </a:fld>
             <a:endParaRPr lang="fr-FR"/>
           </a:p>
@@ -5377,7 +5567,7 @@
           <a:p>
             <a:fld id="{A74F3EA5-292C-4331-BAB5-A6575F471254}" type="datetimeFigureOut">
               <a:rPr lang="fr-FR" smtClean="0"/>
-              <a:t>15/11/2022</a:t>
+              <a:t>06/01/2023</a:t>
             </a:fld>
             <a:endParaRPr lang="fr-FR"/>
           </a:p>
@@ -5629,7 +5819,7 @@
           <a:p>
             <a:fld id="{A74F3EA5-292C-4331-BAB5-A6575F471254}" type="datetimeFigureOut">
               <a:rPr lang="fr-FR" smtClean="0"/>
-              <a:t>15/11/2022</a:t>
+              <a:t>06/01/2023</a:t>
             </a:fld>
             <a:endParaRPr lang="fr-FR"/>
           </a:p>
@@ -5875,7 +6065,7 @@
           <a:p>
             <a:fld id="{A74F3EA5-292C-4331-BAB5-A6575F471254}" type="datetimeFigureOut">
               <a:rPr lang="fr-FR" smtClean="0"/>
-              <a:t>15/11/2022</a:t>
+              <a:t>06/01/2023</a:t>
             </a:fld>
             <a:endParaRPr lang="fr-FR"/>
           </a:p>
@@ -6257,7 +6447,7 @@
           <a:p>
             <a:fld id="{A74F3EA5-292C-4331-BAB5-A6575F471254}" type="datetimeFigureOut">
               <a:rPr lang="fr-FR" smtClean="0"/>
-              <a:t>15/11/2022</a:t>
+              <a:t>06/01/2023</a:t>
             </a:fld>
             <a:endParaRPr lang="fr-FR"/>
           </a:p>
@@ -6383,7 +6573,7 @@
           <a:p>
             <a:fld id="{A74F3EA5-292C-4331-BAB5-A6575F471254}" type="datetimeFigureOut">
               <a:rPr lang="fr-FR" smtClean="0"/>
-              <a:t>15/11/2022</a:t>
+              <a:t>06/01/2023</a:t>
             </a:fld>
             <a:endParaRPr lang="fr-FR"/>
           </a:p>
@@ -6478,7 +6668,7 @@
           <a:p>
             <a:fld id="{A74F3EA5-292C-4331-BAB5-A6575F471254}" type="datetimeFigureOut">
               <a:rPr lang="fr-FR" smtClean="0"/>
-              <a:t>15/11/2022</a:t>
+              <a:t>06/01/2023</a:t>
             </a:fld>
             <a:endParaRPr lang="fr-FR"/>
           </a:p>
@@ -6764,7 +6954,7 @@
           <a:p>
             <a:fld id="{A74F3EA5-292C-4331-BAB5-A6575F471254}" type="datetimeFigureOut">
               <a:rPr lang="fr-FR" smtClean="0"/>
-              <a:t>15/11/2022</a:t>
+              <a:t>06/01/2023</a:t>
             </a:fld>
             <a:endParaRPr lang="fr-FR"/>
           </a:p>
@@ -7026,7 +7216,7 @@
           <a:p>
             <a:fld id="{A74F3EA5-292C-4331-BAB5-A6575F471254}" type="datetimeFigureOut">
               <a:rPr lang="fr-FR" smtClean="0"/>
-              <a:t>15/11/2022</a:t>
+              <a:t>06/01/2023</a:t>
             </a:fld>
             <a:endParaRPr lang="fr-FR"/>
           </a:p>
@@ -7144,7 +7334,7 @@
           <a:p>
             <a:fld id="{A74F3EA5-292C-4331-BAB5-A6575F471254}" type="datetimeFigureOut">
               <a:rPr lang="fr-FR" smtClean="0"/>
-              <a:t>15/11/2022</a:t>
+              <a:t>06/01/2023</a:t>
             </a:fld>
             <a:endParaRPr lang="fr-FR"/>
           </a:p>
@@ -7984,7 +8174,7 @@
           <a:p>
             <a:fld id="{A74F3EA5-292C-4331-BAB5-A6575F471254}" type="datetimeFigureOut">
               <a:rPr lang="fr-FR" smtClean="0"/>
-              <a:t>15/11/2022</a:t>
+              <a:t>06/01/2023</a:t>
             </a:fld>
             <a:endParaRPr lang="fr-FR"/>
           </a:p>
@@ -8767,12 +8957,12 @@
       </p:grpSpPr>
       <p:sp>
         <p:nvSpPr>
-          <p:cNvPr id="2" name="Titre 1"/>
-          <p:cNvSpPr>
-            <a:spLocks noGrp="1"/>
-          </p:cNvSpPr>
-          <p:nvPr>
-            <p:ph type="title"/>
+          <p:cNvPr id="4" name="Titre 3"/>
+          <p:cNvSpPr>
+            <a:spLocks noGrp="1"/>
+          </p:cNvSpPr>
+          <p:nvPr>
+            <p:ph type="ctrTitle"/>
           </p:nvPr>
         </p:nvSpPr>
         <p:spPr/>
@@ -8782,7 +8972,15 @@
           <a:p>
             <a:r>
               <a:rPr lang="fr-FR" dirty="0" smtClean="0"/>
-              <a:t>Plan de défense</a:t>
+              <a:t>Créer une situation </a:t>
+            </a:r>
+            <a:r>
+              <a:rPr lang="fr-FR" dirty="0" err="1" smtClean="0"/>
+              <a:t>tech</a:t>
+            </a:r>
+            <a:r>
+              <a:rPr lang="fr-FR" dirty="0" smtClean="0"/>
+              <a:t>/tac</a:t>
             </a:r>
             <a:endParaRPr lang="fr-FR" dirty="0"/>
           </a:p>
@@ -8790,95 +8988,27 @@
       </p:sp>
       <p:sp>
         <p:nvSpPr>
-          <p:cNvPr id="3" name="Espace réservé du contenu 2"/>
-          <p:cNvSpPr>
-            <a:spLocks noGrp="1"/>
-          </p:cNvSpPr>
-          <p:nvPr>
-            <p:ph idx="1"/>
-          </p:nvPr>
-        </p:nvSpPr>
-        <p:spPr/>
-        <p:txBody>
-          <a:bodyPr>
-            <a:normAutofit lnSpcReduction="10000"/>
-          </a:bodyPr>
-          <a:lstStyle/>
-          <a:p>
-            <a:r>
-              <a:rPr lang="fr-FR" dirty="0" smtClean="0"/>
-              <a:t>Aller en </a:t>
-            </a:r>
-            <a:r>
-              <a:rPr lang="pl-PL" b="1" dirty="0"/>
-              <a:t>32 U LV 52445 </a:t>
-            </a:r>
-            <a:r>
-              <a:rPr lang="pl-PL" b="1" dirty="0" smtClean="0"/>
-              <a:t>19979</a:t>
-            </a:r>
-            <a:endParaRPr lang="fr-FR" b="1" dirty="0" smtClean="0"/>
-          </a:p>
-          <a:p>
-            <a:endParaRPr lang="fr-FR" dirty="0"/>
-          </a:p>
-          <a:p>
-            <a:r>
-              <a:rPr lang="fr-FR" dirty="0" smtClean="0"/>
-              <a:t>A partir de cette position, établir un plan de défense en vecteurs</a:t>
-            </a:r>
-          </a:p>
-          <a:p>
-            <a:endParaRPr lang="fr-FR" dirty="0"/>
-          </a:p>
-          <a:p>
-            <a:r>
-              <a:rPr lang="fr-FR" dirty="0" smtClean="0"/>
-              <a:t>Placer</a:t>
-            </a:r>
-          </a:p>
-          <a:p>
-            <a:pPr lvl="1"/>
-            <a:r>
-              <a:rPr lang="fr-FR" dirty="0" smtClean="0"/>
-              <a:t>Plots PLAE / SAEB / centre fixe</a:t>
-            </a:r>
-          </a:p>
-          <a:p>
-            <a:pPr lvl="1"/>
-            <a:r>
-              <a:rPr lang="fr-FR" dirty="0" smtClean="0"/>
-              <a:t>Secteurs de surveillance</a:t>
-            </a:r>
-          </a:p>
-          <a:p>
-            <a:pPr lvl="1"/>
-            <a:r>
-              <a:rPr lang="fr-FR" dirty="0" smtClean="0"/>
-              <a:t>Position CDP</a:t>
-            </a:r>
-          </a:p>
-          <a:p>
-            <a:pPr lvl="1"/>
-            <a:r>
-              <a:rPr lang="fr-FR" dirty="0" smtClean="0"/>
-              <a:t>Points de regroupement</a:t>
-            </a:r>
-          </a:p>
-          <a:p>
-            <a:pPr lvl="1"/>
-            <a:r>
-              <a:rPr lang="fr-FR" dirty="0" smtClean="0"/>
-              <a:t>Itinéraires</a:t>
-            </a:r>
-            <a:endParaRPr lang="fr-FR" dirty="0"/>
+          <p:cNvPr id="5" name="Sous-titre 4"/>
+          <p:cNvSpPr>
+            <a:spLocks noGrp="1"/>
+          </p:cNvSpPr>
+          <p:nvPr>
+            <p:ph type="subTitle" idx="1"/>
+          </p:nvPr>
+        </p:nvSpPr>
+        <p:spPr/>
+        <p:txBody>
+          <a:bodyPr/>
+          <a:lstStyle/>
+          <a:p>
+            <a:endParaRPr lang="fr-FR"/>
           </a:p>
         </p:txBody>
       </p:sp>
     </p:spTree>
     <p:extLst>
       <p:ext uri="{BB962C8B-B14F-4D97-AF65-F5344CB8AC3E}">
-        <p14:creationId xmlns:p14="http://schemas.microsoft.com/office/powerpoint/2010/main" val="732332061"/>
+        <p14:creationId xmlns:p14="http://schemas.microsoft.com/office/powerpoint/2010/main" val="3448494768"/>
       </p:ext>
     </p:extLst>
   </p:cSld>
@@ -8907,50 +9037,101 @@
       </p:grpSpPr>
       <p:sp>
         <p:nvSpPr>
-          <p:cNvPr id="4" name="Titre 3"/>
-          <p:cNvSpPr>
-            <a:spLocks noGrp="1"/>
-          </p:cNvSpPr>
-          <p:nvPr>
-            <p:ph type="ctrTitle"/>
-          </p:nvPr>
-        </p:nvSpPr>
-        <p:spPr/>
-        <p:txBody>
-          <a:bodyPr/>
+          <p:cNvPr id="2" name="Titre 1"/>
+          <p:cNvSpPr>
+            <a:spLocks noGrp="1"/>
+          </p:cNvSpPr>
+          <p:nvPr>
+            <p:ph type="title"/>
+          </p:nvPr>
+        </p:nvSpPr>
+        <p:spPr/>
+        <p:txBody>
+          <a:bodyPr/>
+          <a:lstStyle/>
+          <a:p>
+            <a:r>
+              <a:rPr lang="fr-FR" dirty="0"/>
+              <a:t>Situation </a:t>
+            </a:r>
+            <a:r>
+              <a:rPr lang="fr-FR" dirty="0" err="1"/>
+              <a:t>tech</a:t>
+            </a:r>
+            <a:r>
+              <a:rPr lang="fr-FR" dirty="0"/>
+              <a:t>/tac</a:t>
+            </a:r>
+          </a:p>
+        </p:txBody>
+      </p:sp>
+      <p:sp>
+        <p:nvSpPr>
+          <p:cNvPr id="3" name="Espace réservé du contenu 2"/>
+          <p:cNvSpPr>
+            <a:spLocks noGrp="1"/>
+          </p:cNvSpPr>
+          <p:nvPr>
+            <p:ph idx="1"/>
+          </p:nvPr>
+        </p:nvSpPr>
+        <p:spPr/>
+        <p:txBody>
+          <a:bodyPr>
+            <a:normAutofit/>
+          </a:bodyPr>
           <a:lstStyle/>
           <a:p>
             <a:r>
               <a:rPr lang="fr-FR" dirty="0" smtClean="0"/>
-              <a:t>Créer un itinéraire</a:t>
-            </a:r>
+              <a:t>Trouver le point côté 228 à l’ouest de </a:t>
+            </a:r>
+            <a:r>
+              <a:rPr lang="fr-FR" dirty="0" err="1" smtClean="0"/>
+              <a:t>Printzheim</a:t>
+            </a:r>
+            <a:endParaRPr lang="fr-FR" dirty="0" smtClean="0"/>
+          </a:p>
+          <a:p>
+            <a:endParaRPr lang="fr-FR" dirty="0" smtClean="0"/>
+          </a:p>
+          <a:p>
+            <a:r>
+              <a:rPr lang="fr-FR" dirty="0" smtClean="0"/>
+              <a:t>Placer ici un point nommé « SAEB 1 »</a:t>
+            </a:r>
+          </a:p>
+          <a:p>
             <a:endParaRPr lang="fr-FR" dirty="0"/>
           </a:p>
-        </p:txBody>
-      </p:sp>
-      <p:sp>
-        <p:nvSpPr>
-          <p:cNvPr id="5" name="Sous-titre 4"/>
-          <p:cNvSpPr>
-            <a:spLocks noGrp="1"/>
-          </p:cNvSpPr>
-          <p:nvPr>
-            <p:ph type="subTitle" idx="1"/>
-          </p:nvPr>
-        </p:nvSpPr>
-        <p:spPr/>
-        <p:txBody>
-          <a:bodyPr/>
-          <a:lstStyle/>
-          <a:p>
-            <a:endParaRPr lang="fr-FR"/>
+          <a:p>
+            <a:r>
+              <a:rPr lang="fr-FR" dirty="0" smtClean="0"/>
+              <a:t>En partant de ce point, mesurer une distance de 2,3km, azimut 244° pour localiser un croisement en T</a:t>
+            </a:r>
+          </a:p>
+          <a:p>
+            <a:endParaRPr lang="fr-FR" dirty="0"/>
+          </a:p>
+          <a:p>
+            <a:r>
+              <a:rPr lang="fr-FR" dirty="0" smtClean="0"/>
+              <a:t>Dessiner une ellipse sur ce croisement</a:t>
+            </a:r>
+            <a:endParaRPr lang="fr-FR" dirty="0"/>
+          </a:p>
+          <a:p>
+            <a:pPr marL="0" indent="0">
+              <a:buNone/>
+            </a:pPr>
+            <a:endParaRPr lang="fr-FR" dirty="0"/>
           </a:p>
         </p:txBody>
       </p:sp>
     </p:spTree>
     <p:extLst>
       <p:ext uri="{BB962C8B-B14F-4D97-AF65-F5344CB8AC3E}">
-        <p14:creationId xmlns:p14="http://schemas.microsoft.com/office/powerpoint/2010/main" val="58861017"/>
+        <p14:creationId xmlns:p14="http://schemas.microsoft.com/office/powerpoint/2010/main" val="4102292299"/>
       </p:ext>
     </p:extLst>
   </p:cSld>
@@ -8993,10 +9174,17 @@
           <a:lstStyle/>
           <a:p>
             <a:r>
-              <a:rPr lang="fr-FR" dirty="0" smtClean="0"/>
-              <a:t>Itinéraire</a:t>
-            </a:r>
-            <a:endParaRPr lang="fr-FR" dirty="0"/>
+              <a:rPr lang="fr-FR" dirty="0"/>
+              <a:t>Situation </a:t>
+            </a:r>
+            <a:r>
+              <a:rPr lang="fr-FR" dirty="0" err="1"/>
+              <a:t>tech</a:t>
+            </a:r>
+            <a:r>
+              <a:rPr lang="fr-FR" dirty="0"/>
+              <a:t>/tac</a:t>
+            </a:r>
           </a:p>
         </p:txBody>
       </p:sp>
@@ -9019,80 +9207,35 @@
           <a:p>
             <a:r>
               <a:rPr lang="fr-FR" dirty="0" smtClean="0"/>
-              <a:t>Tracer </a:t>
-            </a:r>
-            <a:r>
-              <a:rPr lang="fr-FR" dirty="0"/>
-              <a:t>un </a:t>
-            </a:r>
+              <a:t>Importer le symbole VAB</a:t>
+            </a:r>
+          </a:p>
+          <a:p>
+            <a:endParaRPr lang="fr-FR" dirty="0"/>
+          </a:p>
+          <a:p>
             <a:r>
               <a:rPr lang="fr-FR" dirty="0" smtClean="0"/>
-              <a:t>itinéraire en suivant les pistes/chemins</a:t>
-            </a:r>
-          </a:p>
-          <a:p>
-            <a:pPr lvl="1"/>
+              <a:t>Créer le style de point SAEB utilisant le symbole VAB</a:t>
+            </a:r>
+          </a:p>
+          <a:p>
+            <a:endParaRPr lang="fr-FR" dirty="0"/>
+          </a:p>
+          <a:p>
             <a:r>
               <a:rPr lang="fr-FR" dirty="0" smtClean="0"/>
-              <a:t>Départ : </a:t>
-            </a:r>
-            <a:r>
-              <a:rPr lang="pl-PL" b="1" dirty="0"/>
-              <a:t>32ULV 54890 </a:t>
-            </a:r>
-            <a:r>
-              <a:rPr lang="pl-PL" b="1" dirty="0" smtClean="0"/>
-              <a:t>21021</a:t>
-            </a:r>
-            <a:endParaRPr lang="fr-FR" b="1" dirty="0" smtClean="0"/>
-          </a:p>
-          <a:p>
-            <a:pPr lvl="1"/>
+              <a:t>Appliquer le style « SAEB » au point « SAEB 1 »</a:t>
+            </a:r>
+          </a:p>
+          <a:p>
+            <a:endParaRPr lang="fr-FR" dirty="0"/>
+          </a:p>
+          <a:p>
             <a:r>
               <a:rPr lang="fr-FR" dirty="0" smtClean="0"/>
-              <a:t>Arrivée : </a:t>
-            </a:r>
-            <a:r>
-              <a:rPr lang="pl-PL" b="1" dirty="0" smtClean="0"/>
-              <a:t>32ULV </a:t>
-            </a:r>
-            <a:r>
-              <a:rPr lang="pl-PL" b="1" dirty="0"/>
-              <a:t>53274 19025</a:t>
-            </a:r>
-            <a:endParaRPr lang="fr-FR" b="1" dirty="0"/>
-          </a:p>
-          <a:p>
-            <a:endParaRPr lang="fr-FR" dirty="0"/>
-          </a:p>
-          <a:p>
-            <a:r>
-              <a:rPr lang="fr-FR" dirty="0" smtClean="0"/>
-              <a:t>Ajouter un PPO sur chaque croisement rencontré</a:t>
-            </a:r>
-          </a:p>
-          <a:p>
-            <a:endParaRPr lang="fr-FR" dirty="0" smtClean="0"/>
-          </a:p>
-          <a:p>
-            <a:r>
-              <a:rPr lang="fr-FR" dirty="0"/>
-              <a:t>Effectuer le </a:t>
-            </a:r>
-            <a:r>
-              <a:rPr lang="fr-FR" b="1" dirty="0"/>
-              <a:t>profil du tracé</a:t>
-            </a:r>
-            <a:r>
-              <a:rPr lang="fr-FR" dirty="0"/>
-              <a:t> sur cet itinéraire</a:t>
-            </a:r>
-          </a:p>
-          <a:p>
-            <a:pPr lvl="1"/>
-            <a:endParaRPr lang="fr-FR" dirty="0"/>
-          </a:p>
-          <a:p>
+              <a:t>Importer les relais</a:t>
+            </a:r>
             <a:endParaRPr lang="fr-FR" dirty="0"/>
           </a:p>
         </p:txBody>
@@ -9100,7 +9243,7 @@
     </p:spTree>
     <p:extLst>
       <p:ext uri="{BB962C8B-B14F-4D97-AF65-F5344CB8AC3E}">
-        <p14:creationId xmlns:p14="http://schemas.microsoft.com/office/powerpoint/2010/main" val="3140496080"/>
+        <p14:creationId xmlns:p14="http://schemas.microsoft.com/office/powerpoint/2010/main" val="365335706"/>
       </p:ext>
     </p:extLst>
   </p:cSld>
@@ -9144,7 +9287,7 @@
           <a:p>
             <a:r>
               <a:rPr lang="fr-FR" dirty="0" smtClean="0"/>
-              <a:t>Etude de zone</a:t>
+              <a:t>Créer un plan de défense</a:t>
             </a:r>
             <a:endParaRPr lang="fr-FR" dirty="0"/>
           </a:p>
@@ -9172,7 +9315,7 @@
     </p:spTree>
     <p:extLst>
       <p:ext uri="{BB962C8B-B14F-4D97-AF65-F5344CB8AC3E}">
-        <p14:creationId xmlns:p14="http://schemas.microsoft.com/office/powerpoint/2010/main" val="2451992145"/>
+        <p14:creationId xmlns:p14="http://schemas.microsoft.com/office/powerpoint/2010/main" val="2182489076"/>
       </p:ext>
     </p:extLst>
   </p:cSld>
@@ -9216,6 +9359,440 @@
           <a:p>
             <a:r>
               <a:rPr lang="fr-FR" dirty="0" smtClean="0"/>
+              <a:t>Plan de défense</a:t>
+            </a:r>
+            <a:endParaRPr lang="fr-FR" dirty="0"/>
+          </a:p>
+        </p:txBody>
+      </p:sp>
+      <p:sp>
+        <p:nvSpPr>
+          <p:cNvPr id="3" name="Espace réservé du contenu 2"/>
+          <p:cNvSpPr>
+            <a:spLocks noGrp="1"/>
+          </p:cNvSpPr>
+          <p:nvPr>
+            <p:ph idx="1"/>
+          </p:nvPr>
+        </p:nvSpPr>
+        <p:spPr/>
+        <p:txBody>
+          <a:bodyPr>
+            <a:normAutofit lnSpcReduction="10000"/>
+          </a:bodyPr>
+          <a:lstStyle/>
+          <a:p>
+            <a:r>
+              <a:rPr lang="fr-FR" dirty="0" smtClean="0"/>
+              <a:t>Aller en </a:t>
+            </a:r>
+            <a:r>
+              <a:rPr lang="pl-PL" b="1" dirty="0"/>
+              <a:t>32 U LV 52445 </a:t>
+            </a:r>
+            <a:r>
+              <a:rPr lang="pl-PL" b="1" dirty="0" smtClean="0"/>
+              <a:t>19979</a:t>
+            </a:r>
+            <a:endParaRPr lang="fr-FR" b="1" dirty="0" smtClean="0"/>
+          </a:p>
+          <a:p>
+            <a:endParaRPr lang="fr-FR" dirty="0"/>
+          </a:p>
+          <a:p>
+            <a:r>
+              <a:rPr lang="fr-FR" dirty="0" smtClean="0"/>
+              <a:t>A partir de cette position, établir un plan de défense en vecteurs</a:t>
+            </a:r>
+          </a:p>
+          <a:p>
+            <a:endParaRPr lang="fr-FR" dirty="0"/>
+          </a:p>
+          <a:p>
+            <a:r>
+              <a:rPr lang="fr-FR" dirty="0" smtClean="0"/>
+              <a:t>Placer</a:t>
+            </a:r>
+          </a:p>
+          <a:p>
+            <a:pPr lvl="1"/>
+            <a:r>
+              <a:rPr lang="fr-FR" dirty="0" smtClean="0"/>
+              <a:t>Plots PLAE / SAEB / centre fixe</a:t>
+            </a:r>
+          </a:p>
+          <a:p>
+            <a:pPr lvl="1"/>
+            <a:r>
+              <a:rPr lang="fr-FR" dirty="0" smtClean="0"/>
+              <a:t>Secteurs de surveillance</a:t>
+            </a:r>
+          </a:p>
+          <a:p>
+            <a:pPr lvl="1"/>
+            <a:r>
+              <a:rPr lang="fr-FR" dirty="0" smtClean="0"/>
+              <a:t>Position CDP</a:t>
+            </a:r>
+          </a:p>
+          <a:p>
+            <a:pPr lvl="1"/>
+            <a:r>
+              <a:rPr lang="fr-FR" dirty="0" smtClean="0"/>
+              <a:t>Points de regroupement</a:t>
+            </a:r>
+          </a:p>
+          <a:p>
+            <a:pPr lvl="1"/>
+            <a:r>
+              <a:rPr lang="fr-FR" dirty="0" smtClean="0"/>
+              <a:t>Itinéraires</a:t>
+            </a:r>
+            <a:endParaRPr lang="fr-FR" dirty="0"/>
+          </a:p>
+        </p:txBody>
+      </p:sp>
+    </p:spTree>
+    <p:extLst>
+      <p:ext uri="{BB962C8B-B14F-4D97-AF65-F5344CB8AC3E}">
+        <p14:creationId xmlns:p14="http://schemas.microsoft.com/office/powerpoint/2010/main" val="732332061"/>
+      </p:ext>
+    </p:extLst>
+  </p:cSld>
+  <p:clrMapOvr>
+    <a:masterClrMapping/>
+  </p:clrMapOvr>
+</p:sld>
+</file>
+
+<file path=ppt/slides/slide15.xml><?xml version="1.0" encoding="utf-8"?>
+<p:sld xmlns:a="http://schemas.openxmlformats.org/drawingml/2006/main" xmlns:r="http://schemas.openxmlformats.org/officeDocument/2006/relationships" xmlns:p="http://schemas.openxmlformats.org/presentationml/2006/main">
+  <p:cSld>
+    <p:spTree>
+      <p:nvGrpSpPr>
+        <p:cNvPr id="1" name=""/>
+        <p:cNvGrpSpPr/>
+        <p:nvPr/>
+      </p:nvGrpSpPr>
+      <p:grpSpPr>
+        <a:xfrm>
+          <a:off x="0" y="0"/>
+          <a:ext cx="0" cy="0"/>
+          <a:chOff x="0" y="0"/>
+          <a:chExt cx="0" cy="0"/>
+        </a:xfrm>
+      </p:grpSpPr>
+      <p:sp>
+        <p:nvSpPr>
+          <p:cNvPr id="4" name="Titre 3"/>
+          <p:cNvSpPr>
+            <a:spLocks noGrp="1"/>
+          </p:cNvSpPr>
+          <p:nvPr>
+            <p:ph type="ctrTitle"/>
+          </p:nvPr>
+        </p:nvSpPr>
+        <p:spPr/>
+        <p:txBody>
+          <a:bodyPr/>
+          <a:lstStyle/>
+          <a:p>
+            <a:r>
+              <a:rPr lang="fr-FR" dirty="0" smtClean="0"/>
+              <a:t>Créer un itinéraire</a:t>
+            </a:r>
+            <a:endParaRPr lang="fr-FR" dirty="0"/>
+          </a:p>
+        </p:txBody>
+      </p:sp>
+      <p:sp>
+        <p:nvSpPr>
+          <p:cNvPr id="5" name="Sous-titre 4"/>
+          <p:cNvSpPr>
+            <a:spLocks noGrp="1"/>
+          </p:cNvSpPr>
+          <p:nvPr>
+            <p:ph type="subTitle" idx="1"/>
+          </p:nvPr>
+        </p:nvSpPr>
+        <p:spPr/>
+        <p:txBody>
+          <a:bodyPr/>
+          <a:lstStyle/>
+          <a:p>
+            <a:endParaRPr lang="fr-FR"/>
+          </a:p>
+        </p:txBody>
+      </p:sp>
+    </p:spTree>
+    <p:extLst>
+      <p:ext uri="{BB962C8B-B14F-4D97-AF65-F5344CB8AC3E}">
+        <p14:creationId xmlns:p14="http://schemas.microsoft.com/office/powerpoint/2010/main" val="58861017"/>
+      </p:ext>
+    </p:extLst>
+  </p:cSld>
+  <p:clrMapOvr>
+    <a:masterClrMapping/>
+  </p:clrMapOvr>
+</p:sld>
+</file>
+
+<file path=ppt/slides/slide16.xml><?xml version="1.0" encoding="utf-8"?>
+<p:sld xmlns:a="http://schemas.openxmlformats.org/drawingml/2006/main" xmlns:r="http://schemas.openxmlformats.org/officeDocument/2006/relationships" xmlns:p="http://schemas.openxmlformats.org/presentationml/2006/main">
+  <p:cSld>
+    <p:spTree>
+      <p:nvGrpSpPr>
+        <p:cNvPr id="1" name=""/>
+        <p:cNvGrpSpPr/>
+        <p:nvPr/>
+      </p:nvGrpSpPr>
+      <p:grpSpPr>
+        <a:xfrm>
+          <a:off x="0" y="0"/>
+          <a:ext cx="0" cy="0"/>
+          <a:chOff x="0" y="0"/>
+          <a:chExt cx="0" cy="0"/>
+        </a:xfrm>
+      </p:grpSpPr>
+      <p:sp>
+        <p:nvSpPr>
+          <p:cNvPr id="2" name="Titre 1"/>
+          <p:cNvSpPr>
+            <a:spLocks noGrp="1"/>
+          </p:cNvSpPr>
+          <p:nvPr>
+            <p:ph type="title"/>
+          </p:nvPr>
+        </p:nvSpPr>
+        <p:spPr/>
+        <p:txBody>
+          <a:bodyPr/>
+          <a:lstStyle/>
+          <a:p>
+            <a:r>
+              <a:rPr lang="fr-FR" dirty="0" smtClean="0"/>
+              <a:t>Itinéraire</a:t>
+            </a:r>
+            <a:endParaRPr lang="fr-FR" dirty="0"/>
+          </a:p>
+        </p:txBody>
+      </p:sp>
+      <p:sp>
+        <p:nvSpPr>
+          <p:cNvPr id="3" name="Espace réservé du contenu 2"/>
+          <p:cNvSpPr>
+            <a:spLocks noGrp="1"/>
+          </p:cNvSpPr>
+          <p:nvPr>
+            <p:ph idx="1"/>
+          </p:nvPr>
+        </p:nvSpPr>
+        <p:spPr/>
+        <p:txBody>
+          <a:bodyPr>
+            <a:normAutofit/>
+          </a:bodyPr>
+          <a:lstStyle/>
+          <a:p>
+            <a:r>
+              <a:rPr lang="fr-FR" dirty="0" smtClean="0"/>
+              <a:t>Tracer </a:t>
+            </a:r>
+            <a:r>
+              <a:rPr lang="fr-FR" dirty="0"/>
+              <a:t>un </a:t>
+            </a:r>
+            <a:r>
+              <a:rPr lang="fr-FR" dirty="0" smtClean="0"/>
+              <a:t>itinéraire en suivant les pistes/chemins</a:t>
+            </a:r>
+          </a:p>
+          <a:p>
+            <a:pPr lvl="1"/>
+            <a:r>
+              <a:rPr lang="fr-FR" dirty="0" smtClean="0"/>
+              <a:t>Départ : </a:t>
+            </a:r>
+            <a:r>
+              <a:rPr lang="pl-PL" b="1" dirty="0"/>
+              <a:t>32ULV 54890 </a:t>
+            </a:r>
+            <a:r>
+              <a:rPr lang="pl-PL" b="1" dirty="0" smtClean="0"/>
+              <a:t>21021</a:t>
+            </a:r>
+            <a:endParaRPr lang="fr-FR" b="1" dirty="0" smtClean="0"/>
+          </a:p>
+          <a:p>
+            <a:pPr lvl="1"/>
+            <a:r>
+              <a:rPr lang="fr-FR" dirty="0" smtClean="0"/>
+              <a:t>Arrivée : </a:t>
+            </a:r>
+            <a:r>
+              <a:rPr lang="pl-PL" b="1" dirty="0" smtClean="0"/>
+              <a:t>32ULV </a:t>
+            </a:r>
+            <a:r>
+              <a:rPr lang="pl-PL" b="1" dirty="0"/>
+              <a:t>53274 19025</a:t>
+            </a:r>
+            <a:endParaRPr lang="fr-FR" b="1" dirty="0"/>
+          </a:p>
+          <a:p>
+            <a:endParaRPr lang="fr-FR" dirty="0"/>
+          </a:p>
+          <a:p>
+            <a:r>
+              <a:rPr lang="fr-FR" dirty="0" smtClean="0"/>
+              <a:t>Ajouter un PPO sur chaque croisement rencontré</a:t>
+            </a:r>
+          </a:p>
+          <a:p>
+            <a:endParaRPr lang="fr-FR" dirty="0" smtClean="0"/>
+          </a:p>
+          <a:p>
+            <a:r>
+              <a:rPr lang="fr-FR" dirty="0"/>
+              <a:t>Effectuer le </a:t>
+            </a:r>
+            <a:r>
+              <a:rPr lang="fr-FR" b="1" dirty="0"/>
+              <a:t>profil du tracé</a:t>
+            </a:r>
+            <a:r>
+              <a:rPr lang="fr-FR" dirty="0"/>
+              <a:t> sur cet itinéraire</a:t>
+            </a:r>
+          </a:p>
+          <a:p>
+            <a:pPr lvl="1"/>
+            <a:endParaRPr lang="fr-FR" dirty="0"/>
+          </a:p>
+          <a:p>
+            <a:endParaRPr lang="fr-FR" dirty="0"/>
+          </a:p>
+        </p:txBody>
+      </p:sp>
+    </p:spTree>
+    <p:extLst>
+      <p:ext uri="{BB962C8B-B14F-4D97-AF65-F5344CB8AC3E}">
+        <p14:creationId xmlns:p14="http://schemas.microsoft.com/office/powerpoint/2010/main" val="3140496080"/>
+      </p:ext>
+    </p:extLst>
+  </p:cSld>
+  <p:clrMapOvr>
+    <a:masterClrMapping/>
+  </p:clrMapOvr>
+</p:sld>
+</file>
+
+<file path=ppt/slides/slide17.xml><?xml version="1.0" encoding="utf-8"?>
+<p:sld xmlns:a="http://schemas.openxmlformats.org/drawingml/2006/main" xmlns:r="http://schemas.openxmlformats.org/officeDocument/2006/relationships" xmlns:p="http://schemas.openxmlformats.org/presentationml/2006/main">
+  <p:cSld>
+    <p:spTree>
+      <p:nvGrpSpPr>
+        <p:cNvPr id="1" name=""/>
+        <p:cNvGrpSpPr/>
+        <p:nvPr/>
+      </p:nvGrpSpPr>
+      <p:grpSpPr>
+        <a:xfrm>
+          <a:off x="0" y="0"/>
+          <a:ext cx="0" cy="0"/>
+          <a:chOff x="0" y="0"/>
+          <a:chExt cx="0" cy="0"/>
+        </a:xfrm>
+      </p:grpSpPr>
+      <p:sp>
+        <p:nvSpPr>
+          <p:cNvPr id="4" name="Titre 3"/>
+          <p:cNvSpPr>
+            <a:spLocks noGrp="1"/>
+          </p:cNvSpPr>
+          <p:nvPr>
+            <p:ph type="ctrTitle"/>
+          </p:nvPr>
+        </p:nvSpPr>
+        <p:spPr/>
+        <p:txBody>
+          <a:bodyPr/>
+          <a:lstStyle/>
+          <a:p>
+            <a:r>
+              <a:rPr lang="fr-FR" dirty="0" smtClean="0"/>
+              <a:t>Etude de zone</a:t>
+            </a:r>
+            <a:endParaRPr lang="fr-FR" dirty="0"/>
+          </a:p>
+        </p:txBody>
+      </p:sp>
+      <p:sp>
+        <p:nvSpPr>
+          <p:cNvPr id="5" name="Sous-titre 4"/>
+          <p:cNvSpPr>
+            <a:spLocks noGrp="1"/>
+          </p:cNvSpPr>
+          <p:nvPr>
+            <p:ph type="subTitle" idx="1"/>
+          </p:nvPr>
+        </p:nvSpPr>
+        <p:spPr/>
+        <p:txBody>
+          <a:bodyPr/>
+          <a:lstStyle/>
+          <a:p>
+            <a:endParaRPr lang="fr-FR"/>
+          </a:p>
+        </p:txBody>
+      </p:sp>
+    </p:spTree>
+    <p:extLst>
+      <p:ext uri="{BB962C8B-B14F-4D97-AF65-F5344CB8AC3E}">
+        <p14:creationId xmlns:p14="http://schemas.microsoft.com/office/powerpoint/2010/main" val="2451992145"/>
+      </p:ext>
+    </p:extLst>
+  </p:cSld>
+  <p:clrMapOvr>
+    <a:masterClrMapping/>
+  </p:clrMapOvr>
+</p:sld>
+</file>
+
+<file path=ppt/slides/slide18.xml><?xml version="1.0" encoding="utf-8"?>
+<p:sld xmlns:a="http://schemas.openxmlformats.org/drawingml/2006/main" xmlns:r="http://schemas.openxmlformats.org/officeDocument/2006/relationships" xmlns:p="http://schemas.openxmlformats.org/presentationml/2006/main">
+  <p:cSld>
+    <p:spTree>
+      <p:nvGrpSpPr>
+        <p:cNvPr id="1" name=""/>
+        <p:cNvGrpSpPr/>
+        <p:nvPr/>
+      </p:nvGrpSpPr>
+      <p:grpSpPr>
+        <a:xfrm>
+          <a:off x="0" y="0"/>
+          <a:ext cx="0" cy="0"/>
+          <a:chOff x="0" y="0"/>
+          <a:chExt cx="0" cy="0"/>
+        </a:xfrm>
+      </p:grpSpPr>
+      <p:sp>
+        <p:nvSpPr>
+          <p:cNvPr id="2" name="Titre 1"/>
+          <p:cNvSpPr>
+            <a:spLocks noGrp="1"/>
+          </p:cNvSpPr>
+          <p:nvPr>
+            <p:ph type="title"/>
+          </p:nvPr>
+        </p:nvSpPr>
+        <p:spPr/>
+        <p:txBody>
+          <a:bodyPr/>
+          <a:lstStyle/>
+          <a:p>
+            <a:r>
+              <a:rPr lang="fr-FR" dirty="0" smtClean="0"/>
               <a:t>Etude de zone</a:t>
             </a:r>
             <a:endParaRPr lang="fr-FR" dirty="0"/>
@@ -9276,6 +9853,82 @@
     <p:extLst>
       <p:ext uri="{BB962C8B-B14F-4D97-AF65-F5344CB8AC3E}">
         <p14:creationId xmlns:p14="http://schemas.microsoft.com/office/powerpoint/2010/main" val="3780751003"/>
+      </p:ext>
+    </p:extLst>
+  </p:cSld>
+  <p:clrMapOvr>
+    <a:masterClrMapping/>
+  </p:clrMapOvr>
+</p:sld>
+</file>
+
+<file path=ppt/slides/slide19.xml><?xml version="1.0" encoding="utf-8"?>
+<p:sld xmlns:a="http://schemas.openxmlformats.org/drawingml/2006/main" xmlns:r="http://schemas.openxmlformats.org/officeDocument/2006/relationships" xmlns:p="http://schemas.openxmlformats.org/presentationml/2006/main">
+  <p:cSld>
+    <p:spTree>
+      <p:nvGrpSpPr>
+        <p:cNvPr id="1" name=""/>
+        <p:cNvGrpSpPr/>
+        <p:nvPr/>
+      </p:nvGrpSpPr>
+      <p:grpSpPr>
+        <a:xfrm>
+          <a:off x="0" y="0"/>
+          <a:ext cx="0" cy="0"/>
+          <a:chOff x="0" y="0"/>
+          <a:chExt cx="0" cy="0"/>
+        </a:xfrm>
+      </p:grpSpPr>
+      <p:sp>
+        <p:nvSpPr>
+          <p:cNvPr id="4" name="Titre 3"/>
+          <p:cNvSpPr>
+            <a:spLocks noGrp="1"/>
+          </p:cNvSpPr>
+          <p:nvPr>
+            <p:ph type="ctrTitle"/>
+          </p:nvPr>
+        </p:nvSpPr>
+        <p:spPr/>
+        <p:txBody>
+          <a:bodyPr/>
+          <a:lstStyle/>
+          <a:p>
+            <a:r>
+              <a:rPr lang="fr-FR" dirty="0" smtClean="0"/>
+              <a:t>Import </a:t>
+            </a:r>
+            <a:r>
+              <a:rPr lang="fr-FR" dirty="0" err="1" smtClean="0"/>
+              <a:t>gonio</a:t>
+            </a:r>
+            <a:endParaRPr lang="fr-FR" dirty="0"/>
+          </a:p>
+        </p:txBody>
+      </p:sp>
+      <p:sp>
+        <p:nvSpPr>
+          <p:cNvPr id="5" name="Sous-titre 4"/>
+          <p:cNvSpPr>
+            <a:spLocks noGrp="1"/>
+          </p:cNvSpPr>
+          <p:nvPr>
+            <p:ph type="subTitle" idx="1"/>
+          </p:nvPr>
+        </p:nvSpPr>
+        <p:spPr/>
+        <p:txBody>
+          <a:bodyPr/>
+          <a:lstStyle/>
+          <a:p>
+            <a:endParaRPr lang="fr-FR"/>
+          </a:p>
+        </p:txBody>
+      </p:sp>
+    </p:spTree>
+    <p:extLst>
+      <p:ext uri="{BB962C8B-B14F-4D97-AF65-F5344CB8AC3E}">
+        <p14:creationId xmlns:p14="http://schemas.microsoft.com/office/powerpoint/2010/main" val="3479137660"/>
       </p:ext>
     </p:extLst>
   </p:cSld>
@@ -9319,6 +9972,441 @@
           <a:p>
             <a:r>
               <a:rPr lang="fr-FR" dirty="0" smtClean="0"/>
+              <a:t>Préparer un dossier </a:t>
+            </a:r>
+            <a:r>
+              <a:rPr lang="fr-FR" dirty="0" err="1" smtClean="0"/>
+              <a:t>carto</a:t>
+            </a:r>
+            <a:endParaRPr lang="fr-FR" dirty="0"/>
+          </a:p>
+        </p:txBody>
+      </p:sp>
+      <p:sp>
+        <p:nvSpPr>
+          <p:cNvPr id="5" name="Sous-titre 4"/>
+          <p:cNvSpPr>
+            <a:spLocks noGrp="1"/>
+          </p:cNvSpPr>
+          <p:nvPr>
+            <p:ph type="subTitle" idx="1"/>
+          </p:nvPr>
+        </p:nvSpPr>
+        <p:spPr/>
+        <p:txBody>
+          <a:bodyPr/>
+          <a:lstStyle/>
+          <a:p>
+            <a:endParaRPr lang="fr-FR"/>
+          </a:p>
+        </p:txBody>
+      </p:sp>
+    </p:spTree>
+    <p:extLst>
+      <p:ext uri="{BB962C8B-B14F-4D97-AF65-F5344CB8AC3E}">
+        <p14:creationId xmlns:p14="http://schemas.microsoft.com/office/powerpoint/2010/main" val="700318230"/>
+      </p:ext>
+    </p:extLst>
+  </p:cSld>
+  <p:clrMapOvr>
+    <a:masterClrMapping/>
+  </p:clrMapOvr>
+</p:sld>
+</file>
+
+<file path=ppt/slides/slide3.xml><?xml version="1.0" encoding="utf-8"?>
+<p:sld xmlns:a="http://schemas.openxmlformats.org/drawingml/2006/main" xmlns:r="http://schemas.openxmlformats.org/officeDocument/2006/relationships" xmlns:p="http://schemas.openxmlformats.org/presentationml/2006/main">
+  <p:cSld>
+    <p:spTree>
+      <p:nvGrpSpPr>
+        <p:cNvPr id="1" name=""/>
+        <p:cNvGrpSpPr/>
+        <p:nvPr/>
+      </p:nvGrpSpPr>
+      <p:grpSpPr>
+        <a:xfrm>
+          <a:off x="0" y="0"/>
+          <a:ext cx="0" cy="0"/>
+          <a:chOff x="0" y="0"/>
+          <a:chExt cx="0" cy="0"/>
+        </a:xfrm>
+      </p:grpSpPr>
+      <p:sp>
+        <p:nvSpPr>
+          <p:cNvPr id="2" name="Titre 1"/>
+          <p:cNvSpPr>
+            <a:spLocks noGrp="1"/>
+          </p:cNvSpPr>
+          <p:nvPr>
+            <p:ph type="title"/>
+          </p:nvPr>
+        </p:nvSpPr>
+        <p:spPr/>
+        <p:txBody>
+          <a:bodyPr/>
+          <a:lstStyle/>
+          <a:p>
+            <a:r>
+              <a:rPr lang="fr-FR" dirty="0" smtClean="0"/>
+              <a:t>Dossier </a:t>
+            </a:r>
+            <a:r>
+              <a:rPr lang="fr-FR" dirty="0" err="1" smtClean="0"/>
+              <a:t>carto</a:t>
+            </a:r>
+            <a:endParaRPr lang="fr-FR" dirty="0"/>
+          </a:p>
+        </p:txBody>
+      </p:sp>
+      <p:sp>
+        <p:nvSpPr>
+          <p:cNvPr id="3" name="Espace réservé du contenu 2"/>
+          <p:cNvSpPr>
+            <a:spLocks noGrp="1"/>
+          </p:cNvSpPr>
+          <p:nvPr>
+            <p:ph idx="1"/>
+          </p:nvPr>
+        </p:nvSpPr>
+        <p:spPr/>
+        <p:txBody>
+          <a:bodyPr>
+            <a:normAutofit/>
+          </a:bodyPr>
+          <a:lstStyle/>
+          <a:p>
+            <a:r>
+              <a:rPr lang="fr-FR" dirty="0" smtClean="0"/>
+              <a:t>En vue d’une prochaine mission sur </a:t>
+            </a:r>
+            <a:r>
+              <a:rPr lang="fr-FR" b="1" dirty="0" err="1" smtClean="0"/>
+              <a:t>Altwiller</a:t>
+            </a:r>
+            <a:endParaRPr lang="fr-FR" dirty="0"/>
+          </a:p>
+          <a:p>
+            <a:r>
+              <a:rPr lang="fr-FR" dirty="0" smtClean="0"/>
+              <a:t>Préparer un dossier </a:t>
+            </a:r>
+            <a:r>
+              <a:rPr lang="fr-FR" dirty="0" err="1" smtClean="0"/>
+              <a:t>carto</a:t>
+            </a:r>
+            <a:r>
+              <a:rPr lang="fr-FR" dirty="0" smtClean="0"/>
+              <a:t> comprenant notamment</a:t>
+            </a:r>
+            <a:endParaRPr lang="fr-FR" dirty="0"/>
+          </a:p>
+          <a:p>
+            <a:pPr lvl="1"/>
+            <a:r>
+              <a:rPr lang="fr-FR" dirty="0" smtClean="0"/>
+              <a:t>Cartes scannées</a:t>
+            </a:r>
+          </a:p>
+          <a:p>
+            <a:pPr lvl="1"/>
+            <a:r>
+              <a:rPr lang="fr-FR" dirty="0" smtClean="0"/>
+              <a:t>Vue satellite / photo aérienne</a:t>
+            </a:r>
+          </a:p>
+          <a:p>
+            <a:pPr lvl="1"/>
+            <a:r>
+              <a:rPr lang="fr-FR" dirty="0" smtClean="0"/>
+              <a:t>Relief</a:t>
+            </a:r>
+          </a:p>
+          <a:p>
+            <a:pPr lvl="1"/>
+            <a:r>
+              <a:rPr lang="fr-FR" dirty="0" smtClean="0"/>
+              <a:t>Villes</a:t>
+            </a:r>
+          </a:p>
+          <a:p>
+            <a:endParaRPr lang="fr-FR" dirty="0" smtClean="0"/>
+          </a:p>
+          <a:p>
+            <a:r>
+              <a:rPr lang="fr-FR" smtClean="0"/>
+              <a:t>Découper </a:t>
+            </a:r>
+            <a:r>
+              <a:rPr lang="fr-FR" dirty="0" smtClean="0"/>
+              <a:t>la </a:t>
+            </a:r>
+            <a:r>
+              <a:rPr lang="fr-FR" dirty="0" err="1" smtClean="0"/>
+              <a:t>carto</a:t>
+            </a:r>
+            <a:r>
+              <a:rPr lang="fr-FR" dirty="0" smtClean="0"/>
+              <a:t> et relief pour la zone</a:t>
+            </a:r>
+          </a:p>
+          <a:p>
+            <a:r>
+              <a:rPr lang="fr-FR" dirty="0" smtClean="0"/>
+              <a:t>Créer un espace de travail (.GMW) approprié</a:t>
+            </a:r>
+          </a:p>
+          <a:p>
+            <a:endParaRPr lang="fr-FR" dirty="0" smtClean="0"/>
+          </a:p>
+        </p:txBody>
+      </p:sp>
+    </p:spTree>
+    <p:extLst>
+      <p:ext uri="{BB962C8B-B14F-4D97-AF65-F5344CB8AC3E}">
+        <p14:creationId xmlns:p14="http://schemas.microsoft.com/office/powerpoint/2010/main" val="3290643485"/>
+      </p:ext>
+    </p:extLst>
+  </p:cSld>
+  <p:clrMapOvr>
+    <a:masterClrMapping/>
+  </p:clrMapOvr>
+</p:sld>
+</file>
+
+<file path=ppt/slides/slide4.xml><?xml version="1.0" encoding="utf-8"?>
+<p:sld xmlns:a="http://schemas.openxmlformats.org/drawingml/2006/main" xmlns:r="http://schemas.openxmlformats.org/officeDocument/2006/relationships" xmlns:p="http://schemas.openxmlformats.org/presentationml/2006/main">
+  <p:cSld>
+    <p:spTree>
+      <p:nvGrpSpPr>
+        <p:cNvPr id="1" name=""/>
+        <p:cNvGrpSpPr/>
+        <p:nvPr/>
+      </p:nvGrpSpPr>
+      <p:grpSpPr>
+        <a:xfrm>
+          <a:off x="0" y="0"/>
+          <a:ext cx="0" cy="0"/>
+          <a:chOff x="0" y="0"/>
+          <a:chExt cx="0" cy="0"/>
+        </a:xfrm>
+      </p:grpSpPr>
+      <p:sp>
+        <p:nvSpPr>
+          <p:cNvPr id="4" name="Titre 3"/>
+          <p:cNvSpPr>
+            <a:spLocks noGrp="1"/>
+          </p:cNvSpPr>
+          <p:nvPr>
+            <p:ph type="ctrTitle"/>
+          </p:nvPr>
+        </p:nvSpPr>
+        <p:spPr/>
+        <p:txBody>
+          <a:bodyPr/>
+          <a:lstStyle/>
+          <a:p>
+            <a:r>
+              <a:rPr lang="fr-FR" dirty="0" smtClean="0"/>
+              <a:t>Tracer des relevés </a:t>
+            </a:r>
+            <a:r>
+              <a:rPr lang="fr-FR" dirty="0" err="1" smtClean="0"/>
+              <a:t>gonio</a:t>
+            </a:r>
+            <a:endParaRPr lang="fr-FR" dirty="0"/>
+          </a:p>
+        </p:txBody>
+      </p:sp>
+      <p:sp>
+        <p:nvSpPr>
+          <p:cNvPr id="5" name="Sous-titre 4"/>
+          <p:cNvSpPr>
+            <a:spLocks noGrp="1"/>
+          </p:cNvSpPr>
+          <p:nvPr>
+            <p:ph type="subTitle" idx="1"/>
+          </p:nvPr>
+        </p:nvSpPr>
+        <p:spPr/>
+        <p:txBody>
+          <a:bodyPr/>
+          <a:lstStyle/>
+          <a:p>
+            <a:endParaRPr lang="fr-FR"/>
+          </a:p>
+        </p:txBody>
+      </p:sp>
+    </p:spTree>
+    <p:extLst>
+      <p:ext uri="{BB962C8B-B14F-4D97-AF65-F5344CB8AC3E}">
+        <p14:creationId xmlns:p14="http://schemas.microsoft.com/office/powerpoint/2010/main" val="662451042"/>
+      </p:ext>
+    </p:extLst>
+  </p:cSld>
+  <p:clrMapOvr>
+    <a:masterClrMapping/>
+  </p:clrMapOvr>
+</p:sld>
+</file>
+
+<file path=ppt/slides/slide5.xml><?xml version="1.0" encoding="utf-8"?>
+<p:sld xmlns:a="http://schemas.openxmlformats.org/drawingml/2006/main" xmlns:r="http://schemas.openxmlformats.org/officeDocument/2006/relationships" xmlns:p="http://schemas.openxmlformats.org/presentationml/2006/main">
+  <p:cSld>
+    <p:spTree>
+      <p:nvGrpSpPr>
+        <p:cNvPr id="1" name=""/>
+        <p:cNvGrpSpPr/>
+        <p:nvPr/>
+      </p:nvGrpSpPr>
+      <p:grpSpPr>
+        <a:xfrm>
+          <a:off x="0" y="0"/>
+          <a:ext cx="0" cy="0"/>
+          <a:chOff x="0" y="0"/>
+          <a:chExt cx="0" cy="0"/>
+        </a:xfrm>
+      </p:grpSpPr>
+      <p:sp>
+        <p:nvSpPr>
+          <p:cNvPr id="2" name="Titre 1"/>
+          <p:cNvSpPr>
+            <a:spLocks noGrp="1"/>
+          </p:cNvSpPr>
+          <p:nvPr>
+            <p:ph type="title"/>
+          </p:nvPr>
+        </p:nvSpPr>
+        <p:spPr/>
+        <p:txBody>
+          <a:bodyPr/>
+          <a:lstStyle/>
+          <a:p>
+            <a:r>
+              <a:rPr lang="fr-FR" dirty="0" smtClean="0"/>
+              <a:t>Relevés radiogoniométriques</a:t>
+            </a:r>
+            <a:endParaRPr lang="fr-FR" dirty="0"/>
+          </a:p>
+        </p:txBody>
+      </p:sp>
+      <p:sp>
+        <p:nvSpPr>
+          <p:cNvPr id="3" name="Espace réservé du contenu 2"/>
+          <p:cNvSpPr>
+            <a:spLocks noGrp="1"/>
+          </p:cNvSpPr>
+          <p:nvPr>
+            <p:ph idx="1"/>
+          </p:nvPr>
+        </p:nvSpPr>
+        <p:spPr/>
+        <p:txBody>
+          <a:bodyPr>
+            <a:normAutofit/>
+          </a:bodyPr>
+          <a:lstStyle/>
+          <a:p>
+            <a:r>
+              <a:rPr lang="fr-FR" dirty="0" smtClean="0"/>
+              <a:t>Depuis le fichier PV.xlsx, tracer les relevés</a:t>
+            </a:r>
+          </a:p>
+          <a:p>
+            <a:endParaRPr lang="fr-FR" dirty="0" smtClean="0"/>
+          </a:p>
+          <a:p>
+            <a:r>
+              <a:rPr lang="fr-FR" dirty="0" smtClean="0"/>
+              <a:t>Utiliser les positions suivantes</a:t>
+            </a:r>
+            <a:endParaRPr lang="fr-FR" dirty="0"/>
+          </a:p>
+          <a:p>
+            <a:pPr lvl="1"/>
+            <a:r>
+              <a:rPr lang="fr-FR" dirty="0" smtClean="0"/>
+              <a:t>PLAE </a:t>
+            </a:r>
+            <a:r>
+              <a:rPr lang="fr-FR" dirty="0"/>
+              <a:t>10 : 48° 54' 53.3978" N 7° 37' 37.1988" </a:t>
+            </a:r>
+            <a:r>
+              <a:rPr lang="fr-FR" dirty="0" smtClean="0"/>
+              <a:t>E</a:t>
+            </a:r>
+          </a:p>
+          <a:p>
+            <a:pPr lvl="1"/>
+            <a:r>
+              <a:rPr lang="fr-FR" dirty="0"/>
+              <a:t>PLAE 20 : 48° 55' 32.4997" N 7° 38' 37.9492" E</a:t>
+            </a:r>
+            <a:endParaRPr lang="fr-FR" dirty="0" smtClean="0"/>
+          </a:p>
+          <a:p>
+            <a:endParaRPr lang="fr-FR" dirty="0" smtClean="0"/>
+          </a:p>
+          <a:p>
+            <a:pPr lvl="1"/>
+            <a:endParaRPr lang="fr-FR" dirty="0" smtClean="0"/>
+          </a:p>
+          <a:p>
+            <a:pPr lvl="1"/>
+            <a:endParaRPr lang="fr-FR" dirty="0" smtClean="0"/>
+          </a:p>
+          <a:p>
+            <a:endParaRPr lang="fr-FR" dirty="0" smtClean="0"/>
+          </a:p>
+        </p:txBody>
+      </p:sp>
+    </p:spTree>
+    <p:extLst>
+      <p:ext uri="{BB962C8B-B14F-4D97-AF65-F5344CB8AC3E}">
+        <p14:creationId xmlns:p14="http://schemas.microsoft.com/office/powerpoint/2010/main" val="406022128"/>
+      </p:ext>
+    </p:extLst>
+  </p:cSld>
+  <p:clrMapOvr>
+    <a:masterClrMapping/>
+  </p:clrMapOvr>
+</p:sld>
+</file>
+
+<file path=ppt/slides/slide6.xml><?xml version="1.0" encoding="utf-8"?>
+<p:sld xmlns:a="http://schemas.openxmlformats.org/drawingml/2006/main" xmlns:r="http://schemas.openxmlformats.org/officeDocument/2006/relationships" xmlns:p="http://schemas.openxmlformats.org/presentationml/2006/main">
+  <p:cSld>
+    <p:spTree>
+      <p:nvGrpSpPr>
+        <p:cNvPr id="1" name=""/>
+        <p:cNvGrpSpPr/>
+        <p:nvPr/>
+      </p:nvGrpSpPr>
+      <p:grpSpPr>
+        <a:xfrm>
+          <a:off x="0" y="0"/>
+          <a:ext cx="0" cy="0"/>
+          <a:chOff x="0" y="0"/>
+          <a:chExt cx="0" cy="0"/>
+        </a:xfrm>
+      </p:grpSpPr>
+      <p:sp>
+        <p:nvSpPr>
+          <p:cNvPr id="4" name="Titre 3"/>
+          <p:cNvSpPr>
+            <a:spLocks noGrp="1"/>
+          </p:cNvSpPr>
+          <p:nvPr>
+            <p:ph type="ctrTitle"/>
+          </p:nvPr>
+        </p:nvSpPr>
+        <p:spPr/>
+        <p:txBody>
+          <a:bodyPr/>
+          <a:lstStyle/>
+          <a:p>
+            <a:r>
+              <a:rPr lang="fr-FR" dirty="0" smtClean="0"/>
               <a:t>Créer une situation </a:t>
             </a:r>
             <a:r>
@@ -9365,7 +10453,7 @@
 </p:sld>
 </file>
 
-<file path=ppt/slides/slide3.xml><?xml version="1.0" encoding="utf-8"?>
+<file path=ppt/slides/slide7.xml><?xml version="1.0" encoding="utf-8"?>
 <p:sld xmlns:a="http://schemas.openxmlformats.org/drawingml/2006/main" xmlns:r="http://schemas.openxmlformats.org/officeDocument/2006/relationships" xmlns:p="http://schemas.openxmlformats.org/presentationml/2006/main">
   <p:cSld>
     <p:spTree>
@@ -9766,440 +10854,6 @@
 </p:sld>
 </file>
 
-<file path=ppt/slides/slide4.xml><?xml version="1.0" encoding="utf-8"?>
-<p:sld xmlns:a="http://schemas.openxmlformats.org/drawingml/2006/main" xmlns:r="http://schemas.openxmlformats.org/officeDocument/2006/relationships" xmlns:p="http://schemas.openxmlformats.org/presentationml/2006/main">
-  <p:cSld>
-    <p:spTree>
-      <p:nvGrpSpPr>
-        <p:cNvPr id="1" name=""/>
-        <p:cNvGrpSpPr/>
-        <p:nvPr/>
-      </p:nvGrpSpPr>
-      <p:grpSpPr>
-        <a:xfrm>
-          <a:off x="0" y="0"/>
-          <a:ext cx="0" cy="0"/>
-          <a:chOff x="0" y="0"/>
-          <a:chExt cx="0" cy="0"/>
-        </a:xfrm>
-      </p:grpSpPr>
-      <p:sp>
-        <p:nvSpPr>
-          <p:cNvPr id="2" name="Titre 1"/>
-          <p:cNvSpPr>
-            <a:spLocks noGrp="1"/>
-          </p:cNvSpPr>
-          <p:nvPr>
-            <p:ph type="title"/>
-          </p:nvPr>
-        </p:nvSpPr>
-        <p:spPr/>
-        <p:txBody>
-          <a:bodyPr/>
-          <a:lstStyle/>
-          <a:p>
-            <a:r>
-              <a:rPr lang="fr-FR" dirty="0"/>
-              <a:t>Situation </a:t>
-            </a:r>
-            <a:r>
-              <a:rPr lang="fr-FR" dirty="0" err="1"/>
-              <a:t>tech</a:t>
-            </a:r>
-            <a:r>
-              <a:rPr lang="fr-FR" dirty="0"/>
-              <a:t>/tac</a:t>
-            </a:r>
-          </a:p>
-        </p:txBody>
-      </p:sp>
-      <p:sp>
-        <p:nvSpPr>
-          <p:cNvPr id="3" name="Espace réservé du contenu 2"/>
-          <p:cNvSpPr>
-            <a:spLocks noGrp="1"/>
-          </p:cNvSpPr>
-          <p:nvPr>
-            <p:ph idx="1"/>
-          </p:nvPr>
-        </p:nvSpPr>
-        <p:spPr/>
-        <p:txBody>
-          <a:bodyPr>
-            <a:normAutofit/>
-          </a:bodyPr>
-          <a:lstStyle/>
-          <a:p>
-            <a:r>
-              <a:rPr lang="fr-FR" dirty="0" smtClean="0"/>
-              <a:t>Dessiner une box autour de la zone mise en évidence</a:t>
-            </a:r>
-          </a:p>
-          <a:p>
-            <a:pPr lvl="1"/>
-            <a:r>
-              <a:rPr lang="fr-FR" dirty="0" smtClean="0"/>
-              <a:t>Définir le style intérieur en hachure rouge</a:t>
-            </a:r>
-          </a:p>
-          <a:p>
-            <a:pPr lvl="1"/>
-            <a:endParaRPr lang="fr-FR" dirty="0"/>
-          </a:p>
-          <a:p>
-            <a:r>
-              <a:rPr lang="fr-FR" dirty="0" smtClean="0"/>
-              <a:t>Tracer une FLOT d’environ 5km de long sur le cours d’eau</a:t>
-            </a:r>
-          </a:p>
-          <a:p>
-            <a:pPr lvl="1"/>
-            <a:r>
-              <a:rPr lang="fr-FR" dirty="0" smtClean="0"/>
-              <a:t>Style : pointillés jaune</a:t>
-            </a:r>
-          </a:p>
-          <a:p>
-            <a:endParaRPr lang="fr-FR" dirty="0" smtClean="0"/>
-          </a:p>
-        </p:txBody>
-      </p:sp>
-    </p:spTree>
-    <p:extLst>
-      <p:ext uri="{BB962C8B-B14F-4D97-AF65-F5344CB8AC3E}">
-        <p14:creationId xmlns:p14="http://schemas.microsoft.com/office/powerpoint/2010/main" val="1808507157"/>
-      </p:ext>
-    </p:extLst>
-  </p:cSld>
-  <p:clrMapOvr>
-    <a:masterClrMapping/>
-  </p:clrMapOvr>
-</p:sld>
-</file>
-
-<file path=ppt/slides/slide5.xml><?xml version="1.0" encoding="utf-8"?>
-<p:sld xmlns:a="http://schemas.openxmlformats.org/drawingml/2006/main" xmlns:r="http://schemas.openxmlformats.org/officeDocument/2006/relationships" xmlns:p="http://schemas.openxmlformats.org/presentationml/2006/main">
-  <p:cSld>
-    <p:spTree>
-      <p:nvGrpSpPr>
-        <p:cNvPr id="1" name=""/>
-        <p:cNvGrpSpPr/>
-        <p:nvPr/>
-      </p:nvGrpSpPr>
-      <p:grpSpPr>
-        <a:xfrm>
-          <a:off x="0" y="0"/>
-          <a:ext cx="0" cy="0"/>
-          <a:chOff x="0" y="0"/>
-          <a:chExt cx="0" cy="0"/>
-        </a:xfrm>
-      </p:grpSpPr>
-      <p:sp>
-        <p:nvSpPr>
-          <p:cNvPr id="2" name="Titre 1"/>
-          <p:cNvSpPr>
-            <a:spLocks noGrp="1"/>
-          </p:cNvSpPr>
-          <p:nvPr>
-            <p:ph type="title"/>
-          </p:nvPr>
-        </p:nvSpPr>
-        <p:spPr/>
-        <p:txBody>
-          <a:bodyPr/>
-          <a:lstStyle/>
-          <a:p>
-            <a:r>
-              <a:rPr lang="fr-FR" dirty="0"/>
-              <a:t>Situation </a:t>
-            </a:r>
-            <a:r>
-              <a:rPr lang="fr-FR" dirty="0" err="1"/>
-              <a:t>tech</a:t>
-            </a:r>
-            <a:r>
-              <a:rPr lang="fr-FR" dirty="0"/>
-              <a:t>/tac</a:t>
-            </a:r>
-          </a:p>
-        </p:txBody>
-      </p:sp>
-      <p:sp>
-        <p:nvSpPr>
-          <p:cNvPr id="3" name="Espace réservé du contenu 2"/>
-          <p:cNvSpPr>
-            <a:spLocks noGrp="1"/>
-          </p:cNvSpPr>
-          <p:nvPr>
-            <p:ph idx="1"/>
-          </p:nvPr>
-        </p:nvSpPr>
-        <p:spPr/>
-        <p:txBody>
-          <a:bodyPr/>
-          <a:lstStyle/>
-          <a:p>
-            <a:r>
-              <a:rPr lang="fr-FR" dirty="0" smtClean="0"/>
-              <a:t>Importer </a:t>
-            </a:r>
-            <a:r>
-              <a:rPr lang="fr-FR" dirty="0" smtClean="0"/>
-              <a:t>le fichier </a:t>
-            </a:r>
-            <a:r>
-              <a:rPr lang="fr-FR" b="1" dirty="0" err="1" smtClean="0"/>
-              <a:t>etude.gmp</a:t>
-            </a:r>
-            <a:endParaRPr lang="fr-FR" b="1" dirty="0"/>
-          </a:p>
-          <a:p>
-            <a:pPr marL="0" indent="0">
-              <a:buNone/>
-            </a:pPr>
-            <a:endParaRPr lang="fr-FR" dirty="0"/>
-          </a:p>
-          <a:p>
-            <a:r>
-              <a:rPr lang="fr-FR" dirty="0" smtClean="0"/>
-              <a:t>Depuis la couche </a:t>
-            </a:r>
-            <a:r>
-              <a:rPr lang="fr-FR" b="1" dirty="0" smtClean="0"/>
-              <a:t>activité VUHF</a:t>
-            </a:r>
-            <a:r>
-              <a:rPr lang="fr-FR" dirty="0" smtClean="0"/>
-              <a:t>, c</a:t>
-            </a:r>
-            <a:r>
-              <a:rPr lang="fr-FR" dirty="0" smtClean="0"/>
-              <a:t>réer </a:t>
-            </a:r>
-            <a:r>
-              <a:rPr lang="fr-FR" dirty="0" smtClean="0"/>
-              <a:t>une carte de chaleur</a:t>
-            </a:r>
-            <a:endParaRPr lang="fr-FR" dirty="0"/>
-          </a:p>
-        </p:txBody>
-      </p:sp>
-    </p:spTree>
-    <p:extLst>
-      <p:ext uri="{BB962C8B-B14F-4D97-AF65-F5344CB8AC3E}">
-        <p14:creationId xmlns:p14="http://schemas.microsoft.com/office/powerpoint/2010/main" val="2795457777"/>
-      </p:ext>
-    </p:extLst>
-  </p:cSld>
-  <p:clrMapOvr>
-    <a:masterClrMapping/>
-  </p:clrMapOvr>
-</p:sld>
-</file>
-
-<file path=ppt/slides/slide6.xml><?xml version="1.0" encoding="utf-8"?>
-<p:sld xmlns:a="http://schemas.openxmlformats.org/drawingml/2006/main" xmlns:r="http://schemas.openxmlformats.org/officeDocument/2006/relationships" xmlns:p="http://schemas.openxmlformats.org/presentationml/2006/main">
-  <p:cSld>
-    <p:spTree>
-      <p:nvGrpSpPr>
-        <p:cNvPr id="1" name=""/>
-        <p:cNvGrpSpPr/>
-        <p:nvPr/>
-      </p:nvGrpSpPr>
-      <p:grpSpPr>
-        <a:xfrm>
-          <a:off x="0" y="0"/>
-          <a:ext cx="0" cy="0"/>
-          <a:chOff x="0" y="0"/>
-          <a:chExt cx="0" cy="0"/>
-        </a:xfrm>
-      </p:grpSpPr>
-      <p:sp>
-        <p:nvSpPr>
-          <p:cNvPr id="4" name="Titre 3"/>
-          <p:cNvSpPr>
-            <a:spLocks noGrp="1"/>
-          </p:cNvSpPr>
-          <p:nvPr>
-            <p:ph type="ctrTitle"/>
-          </p:nvPr>
-        </p:nvSpPr>
-        <p:spPr/>
-        <p:txBody>
-          <a:bodyPr/>
-          <a:lstStyle/>
-          <a:p>
-            <a:r>
-              <a:rPr lang="fr-FR" dirty="0" smtClean="0"/>
-              <a:t>Créer une situation </a:t>
-            </a:r>
-            <a:r>
-              <a:rPr lang="fr-FR" dirty="0" err="1" smtClean="0"/>
-              <a:t>tech</a:t>
-            </a:r>
-            <a:r>
-              <a:rPr lang="fr-FR" dirty="0" smtClean="0"/>
-              <a:t>/tac</a:t>
-            </a:r>
-            <a:endParaRPr lang="fr-FR" dirty="0"/>
-          </a:p>
-        </p:txBody>
-      </p:sp>
-      <p:sp>
-        <p:nvSpPr>
-          <p:cNvPr id="5" name="Sous-titre 4"/>
-          <p:cNvSpPr>
-            <a:spLocks noGrp="1"/>
-          </p:cNvSpPr>
-          <p:nvPr>
-            <p:ph type="subTitle" idx="1"/>
-          </p:nvPr>
-        </p:nvSpPr>
-        <p:spPr/>
-        <p:txBody>
-          <a:bodyPr/>
-          <a:lstStyle/>
-          <a:p>
-            <a:endParaRPr lang="fr-FR"/>
-          </a:p>
-        </p:txBody>
-      </p:sp>
-    </p:spTree>
-    <p:extLst>
-      <p:ext uri="{BB962C8B-B14F-4D97-AF65-F5344CB8AC3E}">
-        <p14:creationId xmlns:p14="http://schemas.microsoft.com/office/powerpoint/2010/main" val="3448494768"/>
-      </p:ext>
-    </p:extLst>
-  </p:cSld>
-  <p:clrMapOvr>
-    <a:masterClrMapping/>
-  </p:clrMapOvr>
-</p:sld>
-</file>
-
-<file path=ppt/slides/slide7.xml><?xml version="1.0" encoding="utf-8"?>
-<p:sld xmlns:a="http://schemas.openxmlformats.org/drawingml/2006/main" xmlns:r="http://schemas.openxmlformats.org/officeDocument/2006/relationships" xmlns:p="http://schemas.openxmlformats.org/presentationml/2006/main">
-  <p:cSld>
-    <p:spTree>
-      <p:nvGrpSpPr>
-        <p:cNvPr id="1" name=""/>
-        <p:cNvGrpSpPr/>
-        <p:nvPr/>
-      </p:nvGrpSpPr>
-      <p:grpSpPr>
-        <a:xfrm>
-          <a:off x="0" y="0"/>
-          <a:ext cx="0" cy="0"/>
-          <a:chOff x="0" y="0"/>
-          <a:chExt cx="0" cy="0"/>
-        </a:xfrm>
-      </p:grpSpPr>
-      <p:sp>
-        <p:nvSpPr>
-          <p:cNvPr id="2" name="Titre 1"/>
-          <p:cNvSpPr>
-            <a:spLocks noGrp="1"/>
-          </p:cNvSpPr>
-          <p:nvPr>
-            <p:ph type="title"/>
-          </p:nvPr>
-        </p:nvSpPr>
-        <p:spPr/>
-        <p:txBody>
-          <a:bodyPr/>
-          <a:lstStyle/>
-          <a:p>
-            <a:r>
-              <a:rPr lang="fr-FR" dirty="0"/>
-              <a:t>Situation </a:t>
-            </a:r>
-            <a:r>
-              <a:rPr lang="fr-FR" dirty="0" err="1"/>
-              <a:t>tech</a:t>
-            </a:r>
-            <a:r>
-              <a:rPr lang="fr-FR" dirty="0"/>
-              <a:t>/tac</a:t>
-            </a:r>
-          </a:p>
-        </p:txBody>
-      </p:sp>
-      <p:sp>
-        <p:nvSpPr>
-          <p:cNvPr id="3" name="Espace réservé du contenu 2"/>
-          <p:cNvSpPr>
-            <a:spLocks noGrp="1"/>
-          </p:cNvSpPr>
-          <p:nvPr>
-            <p:ph idx="1"/>
-          </p:nvPr>
-        </p:nvSpPr>
-        <p:spPr/>
-        <p:txBody>
-          <a:bodyPr>
-            <a:normAutofit/>
-          </a:bodyPr>
-          <a:lstStyle/>
-          <a:p>
-            <a:r>
-              <a:rPr lang="fr-FR" dirty="0" smtClean="0"/>
-              <a:t>Trouver le point côté 228 à l’ouest de </a:t>
-            </a:r>
-            <a:r>
-              <a:rPr lang="fr-FR" dirty="0" err="1" smtClean="0"/>
-              <a:t>Printzheim</a:t>
-            </a:r>
-            <a:endParaRPr lang="fr-FR" dirty="0" smtClean="0"/>
-          </a:p>
-          <a:p>
-            <a:endParaRPr lang="fr-FR" dirty="0" smtClean="0"/>
-          </a:p>
-          <a:p>
-            <a:r>
-              <a:rPr lang="fr-FR" dirty="0" smtClean="0"/>
-              <a:t>Placer ici un point nommé « SAEB 1 »</a:t>
-            </a:r>
-          </a:p>
-          <a:p>
-            <a:endParaRPr lang="fr-FR" dirty="0"/>
-          </a:p>
-          <a:p>
-            <a:r>
-              <a:rPr lang="fr-FR" dirty="0" smtClean="0"/>
-              <a:t>En partant de ce point, mesurer une distance de 2,3km, azimut 244° pour localiser un croisement en T</a:t>
-            </a:r>
-          </a:p>
-          <a:p>
-            <a:endParaRPr lang="fr-FR" dirty="0"/>
-          </a:p>
-          <a:p>
-            <a:r>
-              <a:rPr lang="fr-FR" dirty="0" smtClean="0"/>
-              <a:t>Dessiner une ellipse sur ce croisement</a:t>
-            </a:r>
-            <a:endParaRPr lang="fr-FR" dirty="0"/>
-          </a:p>
-          <a:p>
-            <a:pPr marL="0" indent="0">
-              <a:buNone/>
-            </a:pPr>
-            <a:endParaRPr lang="fr-FR" dirty="0"/>
-          </a:p>
-        </p:txBody>
-      </p:sp>
-    </p:spTree>
-    <p:extLst>
-      <p:ext uri="{BB962C8B-B14F-4D97-AF65-F5344CB8AC3E}">
-        <p14:creationId xmlns:p14="http://schemas.microsoft.com/office/powerpoint/2010/main" val="4102292299"/>
-      </p:ext>
-    </p:extLst>
-  </p:cSld>
-  <p:clrMapOvr>
-    <a:masterClrMapping/>
-  </p:clrMapOvr>
-</p:sld>
-</file>
-
 <file path=ppt/slides/slide8.xml><?xml version="1.0" encoding="utf-8"?>
 <p:sld xmlns:a="http://schemas.openxmlformats.org/drawingml/2006/main" xmlns:r="http://schemas.openxmlformats.org/officeDocument/2006/relationships" xmlns:p="http://schemas.openxmlformats.org/presentationml/2006/main">
   <p:cSld>
@@ -10266,56 +10920,42 @@
           <a:p>
             <a:r>
               <a:rPr lang="fr-FR" dirty="0" smtClean="0"/>
-              <a:t>Importer le symbole VAB</a:t>
-            </a:r>
-          </a:p>
-          <a:p>
+              <a:t>Dessiner une box autour de la zone mise en évidence</a:t>
+            </a:r>
+          </a:p>
+          <a:p>
+            <a:pPr lvl="1"/>
+            <a:r>
+              <a:rPr lang="fr-FR" dirty="0" smtClean="0"/>
+              <a:t>Définir le style intérieur en hachure rouge</a:t>
+            </a:r>
+          </a:p>
+          <a:p>
+            <a:pPr lvl="1"/>
             <a:endParaRPr lang="fr-FR" dirty="0"/>
           </a:p>
           <a:p>
             <a:r>
               <a:rPr lang="fr-FR" dirty="0" smtClean="0"/>
-              <a:t>Créer le style de point </a:t>
-            </a:r>
+              <a:t>Tracer une FLOT d’environ 5km de long sur le cours d’eau</a:t>
+            </a:r>
+          </a:p>
+          <a:p>
+            <a:pPr lvl="1"/>
             <a:r>
               <a:rPr lang="fr-FR" dirty="0" smtClean="0"/>
-              <a:t>SAEB utilisant le symbole VAB</a:t>
-            </a:r>
+              <a:t>Style : pointillés jaune</a:t>
+            </a:r>
+          </a:p>
+          <a:p>
             <a:endParaRPr lang="fr-FR" dirty="0" smtClean="0"/>
-          </a:p>
-          <a:p>
-            <a:endParaRPr lang="fr-FR" dirty="0"/>
-          </a:p>
-          <a:p>
-            <a:r>
-              <a:rPr lang="fr-FR" dirty="0" smtClean="0"/>
-              <a:t>Appliquer le style « SAEB » au point </a:t>
-            </a:r>
-            <a:r>
-              <a:rPr lang="fr-FR" dirty="0" smtClean="0"/>
-              <a:t>« SAEB 1 </a:t>
-            </a:r>
-            <a:r>
-              <a:rPr lang="fr-FR" dirty="0" smtClean="0"/>
-              <a:t>»</a:t>
-            </a:r>
-          </a:p>
-          <a:p>
-            <a:endParaRPr lang="fr-FR" dirty="0"/>
-          </a:p>
-          <a:p>
-            <a:r>
-              <a:rPr lang="fr-FR" dirty="0" smtClean="0"/>
-              <a:t>Importer les relais</a:t>
-            </a:r>
-            <a:endParaRPr lang="fr-FR" dirty="0"/>
           </a:p>
         </p:txBody>
       </p:sp>
     </p:spTree>
     <p:extLst>
       <p:ext uri="{BB962C8B-B14F-4D97-AF65-F5344CB8AC3E}">
-        <p14:creationId xmlns:p14="http://schemas.microsoft.com/office/powerpoint/2010/main" val="365335706"/>
+        <p14:creationId xmlns:p14="http://schemas.microsoft.com/office/powerpoint/2010/main" val="1808507157"/>
       </p:ext>
     </p:extLst>
   </p:cSld>
@@ -10344,12 +10984,42 @@
       </p:grpSpPr>
       <p:sp>
         <p:nvSpPr>
-          <p:cNvPr id="4" name="Titre 3"/>
-          <p:cNvSpPr>
-            <a:spLocks noGrp="1"/>
-          </p:cNvSpPr>
-          <p:nvPr>
-            <p:ph type="ctrTitle"/>
+          <p:cNvPr id="2" name="Titre 1"/>
+          <p:cNvSpPr>
+            <a:spLocks noGrp="1"/>
+          </p:cNvSpPr>
+          <p:nvPr>
+            <p:ph type="title"/>
+          </p:nvPr>
+        </p:nvSpPr>
+        <p:spPr/>
+        <p:txBody>
+          <a:bodyPr/>
+          <a:lstStyle/>
+          <a:p>
+            <a:r>
+              <a:rPr lang="fr-FR" dirty="0"/>
+              <a:t>Situation </a:t>
+            </a:r>
+            <a:r>
+              <a:rPr lang="fr-FR" dirty="0" err="1"/>
+              <a:t>tech</a:t>
+            </a:r>
+            <a:r>
+              <a:rPr lang="fr-FR" dirty="0"/>
+              <a:t>/tac</a:t>
+            </a:r>
+          </a:p>
+        </p:txBody>
+      </p:sp>
+      <p:sp>
+        <p:nvSpPr>
+          <p:cNvPr id="3" name="Espace réservé du contenu 2"/>
+          <p:cNvSpPr>
+            <a:spLocks noGrp="1"/>
+          </p:cNvSpPr>
+          <p:nvPr>
+            <p:ph idx="1"/>
           </p:nvPr>
         </p:nvSpPr>
         <p:spPr/>
@@ -10359,35 +11029,41 @@
           <a:p>
             <a:r>
               <a:rPr lang="fr-FR" dirty="0" smtClean="0"/>
-              <a:t>Créer un plan de défense</a:t>
-            </a:r>
+              <a:t>Importer le fichier </a:t>
+            </a:r>
+            <a:r>
+              <a:rPr lang="fr-FR" b="1" dirty="0" err="1" smtClean="0"/>
+              <a:t>etude.gmp</a:t>
+            </a:r>
+            <a:endParaRPr lang="fr-FR" b="1" dirty="0"/>
+          </a:p>
+          <a:p>
+            <a:pPr marL="0" indent="0">
+              <a:buNone/>
+            </a:pPr>
             <a:endParaRPr lang="fr-FR" dirty="0"/>
           </a:p>
-        </p:txBody>
-      </p:sp>
-      <p:sp>
-        <p:nvSpPr>
-          <p:cNvPr id="5" name="Sous-titre 4"/>
-          <p:cNvSpPr>
-            <a:spLocks noGrp="1"/>
-          </p:cNvSpPr>
-          <p:nvPr>
-            <p:ph type="subTitle" idx="1"/>
-          </p:nvPr>
-        </p:nvSpPr>
-        <p:spPr/>
-        <p:txBody>
-          <a:bodyPr/>
-          <a:lstStyle/>
-          <a:p>
-            <a:endParaRPr lang="fr-FR"/>
+          <a:p>
+            <a:r>
+              <a:rPr lang="fr-FR" dirty="0" smtClean="0"/>
+              <a:t>Depuis la couche </a:t>
+            </a:r>
+            <a:r>
+              <a:rPr lang="fr-FR" b="1" dirty="0" smtClean="0"/>
+              <a:t>activité VUHF</a:t>
+            </a:r>
+            <a:r>
+              <a:rPr lang="fr-FR" dirty="0" smtClean="0"/>
+              <a:t>, créer une carte de chaleur</a:t>
+            </a:r>
+            <a:endParaRPr lang="fr-FR" dirty="0"/>
           </a:p>
         </p:txBody>
       </p:sp>
     </p:spTree>
     <p:extLst>
       <p:ext uri="{BB962C8B-B14F-4D97-AF65-F5344CB8AC3E}">
-        <p14:creationId xmlns:p14="http://schemas.microsoft.com/office/powerpoint/2010/main" val="2182489076"/>
+        <p14:creationId xmlns:p14="http://schemas.microsoft.com/office/powerpoint/2010/main" val="2795457777"/>
       </p:ext>
     </p:extLst>
   </p:cSld>

</xml_diff>